<commit_message>
Update instructions to highlight the eye openess
</commit_message>
<xml_diff>
--- a/Instructions.pptx
+++ b/Instructions.pptx
@@ -264,7 +264,7 @@
           <a:p>
             <a:fld id="{373AEA94-00EF-4DE4-8FA3-F9ECAA6DD2CF}" type="datetimeFigureOut">
               <a:rPr lang="zh-CN" altLang="en-US" smtClean="0"/>
-              <a:t>2025/3/2</a:t>
+              <a:t>2025/3/3</a:t>
             </a:fld>
             <a:endParaRPr lang="zh-CN" altLang="en-US"/>
           </a:p>
@@ -1266,7 +1266,7 @@
           <a:p>
             <a:fld id="{E45C1C0B-BEED-40A4-BB03-2B5E358FDD63}" type="datetimeFigureOut">
               <a:rPr lang="zh-CN" altLang="en-US" smtClean="0"/>
-              <a:t>2025/3/2</a:t>
+              <a:t>2025/3/3</a:t>
             </a:fld>
             <a:endParaRPr lang="zh-CN" altLang="en-US"/>
           </a:p>
@@ -1464,7 +1464,7 @@
           <a:p>
             <a:fld id="{E45C1C0B-BEED-40A4-BB03-2B5E358FDD63}" type="datetimeFigureOut">
               <a:rPr lang="zh-CN" altLang="en-US" smtClean="0"/>
-              <a:t>2025/3/2</a:t>
+              <a:t>2025/3/3</a:t>
             </a:fld>
             <a:endParaRPr lang="zh-CN" altLang="en-US"/>
           </a:p>
@@ -1672,7 +1672,7 @@
           <a:p>
             <a:fld id="{E45C1C0B-BEED-40A4-BB03-2B5E358FDD63}" type="datetimeFigureOut">
               <a:rPr lang="zh-CN" altLang="en-US" smtClean="0"/>
-              <a:t>2025/3/2</a:t>
+              <a:t>2025/3/3</a:t>
             </a:fld>
             <a:endParaRPr lang="zh-CN" altLang="en-US"/>
           </a:p>
@@ -1870,7 +1870,7 @@
           <a:p>
             <a:fld id="{E45C1C0B-BEED-40A4-BB03-2B5E358FDD63}" type="datetimeFigureOut">
               <a:rPr lang="zh-CN" altLang="en-US" smtClean="0"/>
-              <a:t>2025/3/2</a:t>
+              <a:t>2025/3/3</a:t>
             </a:fld>
             <a:endParaRPr lang="zh-CN" altLang="en-US"/>
           </a:p>
@@ -2145,7 +2145,7 @@
           <a:p>
             <a:fld id="{E45C1C0B-BEED-40A4-BB03-2B5E358FDD63}" type="datetimeFigureOut">
               <a:rPr lang="zh-CN" altLang="en-US" smtClean="0"/>
-              <a:t>2025/3/2</a:t>
+              <a:t>2025/3/3</a:t>
             </a:fld>
             <a:endParaRPr lang="zh-CN" altLang="en-US"/>
           </a:p>
@@ -2410,7 +2410,7 @@
           <a:p>
             <a:fld id="{E45C1C0B-BEED-40A4-BB03-2B5E358FDD63}" type="datetimeFigureOut">
               <a:rPr lang="zh-CN" altLang="en-US" smtClean="0"/>
-              <a:t>2025/3/2</a:t>
+              <a:t>2025/3/3</a:t>
             </a:fld>
             <a:endParaRPr lang="zh-CN" altLang="en-US"/>
           </a:p>
@@ -2822,7 +2822,7 @@
           <a:p>
             <a:fld id="{E45C1C0B-BEED-40A4-BB03-2B5E358FDD63}" type="datetimeFigureOut">
               <a:rPr lang="zh-CN" altLang="en-US" smtClean="0"/>
-              <a:t>2025/3/2</a:t>
+              <a:t>2025/3/3</a:t>
             </a:fld>
             <a:endParaRPr lang="zh-CN" altLang="en-US"/>
           </a:p>
@@ -2963,7 +2963,7 @@
           <a:p>
             <a:fld id="{E45C1C0B-BEED-40A4-BB03-2B5E358FDD63}" type="datetimeFigureOut">
               <a:rPr lang="zh-CN" altLang="en-US" smtClean="0"/>
-              <a:t>2025/3/2</a:t>
+              <a:t>2025/3/3</a:t>
             </a:fld>
             <a:endParaRPr lang="zh-CN" altLang="en-US"/>
           </a:p>
@@ -3076,7 +3076,7 @@
           <a:p>
             <a:fld id="{E45C1C0B-BEED-40A4-BB03-2B5E358FDD63}" type="datetimeFigureOut">
               <a:rPr lang="zh-CN" altLang="en-US" smtClean="0"/>
-              <a:t>2025/3/2</a:t>
+              <a:t>2025/3/3</a:t>
             </a:fld>
             <a:endParaRPr lang="zh-CN" altLang="en-US"/>
           </a:p>
@@ -3387,7 +3387,7 @@
           <a:p>
             <a:fld id="{E45C1C0B-BEED-40A4-BB03-2B5E358FDD63}" type="datetimeFigureOut">
               <a:rPr lang="zh-CN" altLang="en-US" smtClean="0"/>
-              <a:t>2025/3/2</a:t>
+              <a:t>2025/3/3</a:t>
             </a:fld>
             <a:endParaRPr lang="zh-CN" altLang="en-US"/>
           </a:p>
@@ -3675,7 +3675,7 @@
           <a:p>
             <a:fld id="{E45C1C0B-BEED-40A4-BB03-2B5E358FDD63}" type="datetimeFigureOut">
               <a:rPr lang="zh-CN" altLang="en-US" smtClean="0"/>
-              <a:t>2025/3/2</a:t>
+              <a:t>2025/3/3</a:t>
             </a:fld>
             <a:endParaRPr lang="zh-CN" altLang="en-US"/>
           </a:p>
@@ -3916,7 +3916,7 @@
           <a:p>
             <a:fld id="{E45C1C0B-BEED-40A4-BB03-2B5E358FDD63}" type="datetimeFigureOut">
               <a:rPr lang="zh-CN" altLang="en-US" smtClean="0"/>
-              <a:t>2025/3/2</a:t>
+              <a:t>2025/3/3</a:t>
             </a:fld>
             <a:endParaRPr lang="zh-CN" altLang="en-US"/>
           </a:p>
@@ -9468,7 +9468,7 @@
         <p:spPr>
           <a:xfrm>
             <a:off x="1500050" y="1645919"/>
-            <a:ext cx="9714412" cy="3064300"/>
+            <a:ext cx="9714412" cy="3833742"/>
           </a:xfrm>
           <a:prstGeom prst="rect">
             <a:avLst/>
@@ -9603,7 +9603,7 @@
                 <a:latin typeface="楷体" panose="02010609060101010101" pitchFamily="49" charset="-122"/>
                 <a:ea typeface="楷体" panose="02010609060101010101" pitchFamily="49" charset="-122"/>
               </a:rPr>
-              <a:t>克制眨眼、避免移动头部</a:t>
+              <a:t>不要眯眼睛、克制眨眼、避免移动头部</a:t>
             </a:r>
             <a:r>
               <a:rPr lang="zh-CN" altLang="en-US" sz="4000" dirty="0">
@@ -10745,12 +10745,17 @@
         </p:blipFill>
         <p:spPr>
           <a:xfrm>
-            <a:off x="1969925" y="2516142"/>
-            <a:ext cx="7590792" cy="4269820"/>
+            <a:off x="1559201" y="3107101"/>
+            <a:ext cx="6046890" cy="3401375"/>
           </a:xfrm>
           <a:prstGeom prst="rect">
             <a:avLst/>
           </a:prstGeom>
+          <a:ln>
+            <a:solidFill>
+              <a:schemeClr val="tx1"/>
+            </a:solidFill>
+          </a:ln>
         </p:spPr>
       </p:pic>
       <p:sp>
@@ -10833,7 +10838,7 @@
         <p:spPr>
           <a:xfrm>
             <a:off x="1500050" y="1645919"/>
-            <a:ext cx="9714412" cy="755976"/>
+            <a:ext cx="9714412" cy="1525418"/>
           </a:xfrm>
           <a:prstGeom prst="rect">
             <a:avLst/>
@@ -10873,20 +10878,47 @@
               </a:rPr>
               <a:t>按空格开始校准，用眼睛追踪光斑</a:t>
             </a:r>
-            <a:endParaRPr kumimoji="0" lang="en-US" altLang="zh-CN" sz="4000" b="0" i="0" u="none" strike="noStrike" kern="1200" cap="none" spc="0" normalizeH="0" baseline="0" noProof="0" dirty="0">
-              <a:ln>
-                <a:noFill/>
-              </a:ln>
+            <a:endParaRPr lang="en-US" altLang="zh-CN" sz="4000" dirty="0">
               <a:solidFill>
                 <a:prstClr val="black"/>
               </a:solidFill>
-              <a:effectLst/>
-              <a:uLnTx/>
-              <a:uFillTx/>
               <a:latin typeface="楷体" panose="02010609060101010101" pitchFamily="49" charset="-122"/>
               <a:ea typeface="楷体" panose="02010609060101010101" pitchFamily="49" charset="-122"/>
-              <a:cs typeface="+mn-cs"/>
             </a:endParaRPr>
+          </a:p>
+          <a:p>
+            <a:pPr marR="0" lvl="0" algn="l" defTabSz="914400" rtl="0" eaLnBrk="1" fontAlgn="auto" latinLnBrk="0" hangingPunct="1">
+              <a:lnSpc>
+                <a:spcPct val="125000"/>
+              </a:lnSpc>
+              <a:spcBef>
+                <a:spcPts val="0"/>
+              </a:spcBef>
+              <a:spcAft>
+                <a:spcPts val="0"/>
+              </a:spcAft>
+              <a:buClrTx/>
+              <a:buSzTx/>
+              <a:tabLst/>
+              <a:defRPr/>
+            </a:pPr>
+            <a:r>
+              <a:rPr kumimoji="0" lang="en-US" altLang="zh-CN" sz="4000" b="0" i="0" u="none" strike="noStrike" kern="1200" cap="none" spc="0" normalizeH="0" baseline="0" noProof="0" dirty="0">
+                <a:ln>
+                  <a:noFill/>
+                </a:ln>
+                <a:solidFill>
+                  <a:prstClr val="black"/>
+                </a:solidFill>
+                <a:effectLst/>
+                <a:uLnTx/>
+                <a:uFillTx/>
+                <a:latin typeface="楷体" panose="02010609060101010101" pitchFamily="49" charset="-122"/>
+                <a:ea typeface="楷体" panose="02010609060101010101" pitchFamily="49" charset="-122"/>
+                <a:cs typeface="+mn-cs"/>
+              </a:rPr>
+              <a:t>	</a:t>
+            </a:r>
           </a:p>
         </p:txBody>
       </p:sp>
@@ -11152,7 +11184,7 @@
         </p:nvSpPr>
         <p:spPr>
           <a:xfrm>
-            <a:off x="4134926" y="4209691"/>
+            <a:off x="2863968" y="4382220"/>
             <a:ext cx="3347052" cy="707886"/>
           </a:xfrm>
           <a:prstGeom prst="rect">

</xml_diff>

<commit_message>
update instructions with 10s limitation
</commit_message>
<xml_diff>
--- a/Instructions.pptx
+++ b/Instructions.pptx
@@ -3,27 +3,30 @@
 <p:presentation xmlns:a="http://schemas.openxmlformats.org/drawingml/2006/main" xmlns:r="http://schemas.openxmlformats.org/officeDocument/2006/relationships" xmlns:p="http://schemas.openxmlformats.org/presentationml/2006/main">
   <p:sldMasterIdLst>
     <p:sldMasterId id="2147483648" r:id="rId1"/>
-    <p:sldMasterId id="2147483660" r:id="rId3"/>
+    <p:sldMasterId id="2147483660" r:id="rId2"/>
   </p:sldMasterIdLst>
   <p:notesMasterIdLst>
-    <p:notesMasterId r:id="rId5"/>
+    <p:notesMasterId r:id="rId18"/>
   </p:notesMasterIdLst>
+  <p:handoutMasterIdLst>
+    <p:handoutMasterId r:id="rId19"/>
+  </p:handoutMasterIdLst>
   <p:sldIdLst>
-    <p:sldId id="273" r:id="rId4"/>
-    <p:sldId id="269" r:id="rId6"/>
-    <p:sldId id="274" r:id="rId7"/>
-    <p:sldId id="275" r:id="rId8"/>
-    <p:sldId id="256" r:id="rId9"/>
-    <p:sldId id="257" r:id="rId10"/>
-    <p:sldId id="258" r:id="rId11"/>
-    <p:sldId id="259" r:id="rId12"/>
-    <p:sldId id="260" r:id="rId13"/>
-    <p:sldId id="261" r:id="rId14"/>
-    <p:sldId id="271" r:id="rId15"/>
-    <p:sldId id="270" r:id="rId16"/>
-    <p:sldId id="279" r:id="rId17"/>
-    <p:sldId id="278" r:id="rId18"/>
-    <p:sldId id="277" r:id="rId19"/>
+    <p:sldId id="273" r:id="rId3"/>
+    <p:sldId id="269" r:id="rId4"/>
+    <p:sldId id="274" r:id="rId5"/>
+    <p:sldId id="275" r:id="rId6"/>
+    <p:sldId id="256" r:id="rId7"/>
+    <p:sldId id="257" r:id="rId8"/>
+    <p:sldId id="258" r:id="rId9"/>
+    <p:sldId id="259" r:id="rId10"/>
+    <p:sldId id="260" r:id="rId11"/>
+    <p:sldId id="261" r:id="rId12"/>
+    <p:sldId id="271" r:id="rId13"/>
+    <p:sldId id="270" r:id="rId14"/>
+    <p:sldId id="279" r:id="rId15"/>
+    <p:sldId id="278" r:id="rId16"/>
+    <p:sldId id="277" r:id="rId17"/>
   </p:sldIdLst>
   <p:sldSz cx="12192000" cy="6858000"/>
   <p:notesSz cx="6858000" cy="9144000"/>
@@ -170,8 +173,176 @@
         </p14:section>
       </p14:sectionLst>
     </p:ext>
+    <p:ext uri="{EFAFB233-063F-42B5-8137-9DF3F51BA10A}">
+      <p15:sldGuideLst xmlns:p15="http://schemas.microsoft.com/office/powerpoint/2012/main"/>
+    </p:ext>
   </p:extLst>
 </p:presentation>
+</file>
+
+<file path=ppt/handoutMasters/handoutMaster1.xml><?xml version="1.0" encoding="utf-8"?>
+<p:handoutMaster xmlns:a="http://schemas.openxmlformats.org/drawingml/2006/main" xmlns:r="http://schemas.openxmlformats.org/officeDocument/2006/relationships" xmlns:p="http://schemas.openxmlformats.org/presentationml/2006/main">
+  <p:cSld>
+    <p:bg>
+      <p:bgRef idx="1001">
+        <a:schemeClr val="bg1"/>
+      </p:bgRef>
+    </p:bg>
+    <p:spTree>
+      <p:nvGrpSpPr>
+        <p:cNvPr id="1" name=""/>
+        <p:cNvGrpSpPr/>
+        <p:nvPr/>
+      </p:nvGrpSpPr>
+      <p:grpSpPr>
+        <a:xfrm>
+          <a:off x="0" y="0"/>
+          <a:ext cx="0" cy="0"/>
+          <a:chOff x="0" y="0"/>
+          <a:chExt cx="0" cy="0"/>
+        </a:xfrm>
+      </p:grpSpPr>
+      <p:sp>
+        <p:nvSpPr>
+          <p:cNvPr id="2" name="页眉占位符 1"/>
+          <p:cNvSpPr>
+            <a:spLocks noGrp="1"/>
+          </p:cNvSpPr>
+          <p:nvPr>
+            <p:ph type="hdr" sz="quarter"/>
+          </p:nvPr>
+        </p:nvSpPr>
+        <p:spPr>
+          <a:xfrm>
+            <a:off x="0" y="0"/>
+            <a:ext cx="2971800" cy="458788"/>
+          </a:xfrm>
+          <a:prstGeom prst="rect">
+            <a:avLst/>
+          </a:prstGeom>
+        </p:spPr>
+        <p:txBody>
+          <a:bodyPr vert="horz" lIns="91440" tIns="45720" rIns="91440" bIns="45720" rtlCol="0"/>
+          <a:lstStyle>
+            <a:lvl1pPr algn="l">
+              <a:defRPr sz="1200"/>
+            </a:lvl1pPr>
+          </a:lstStyle>
+          <a:p>
+            <a:endParaRPr lang="zh-CN" altLang="en-US"/>
+          </a:p>
+        </p:txBody>
+      </p:sp>
+      <p:sp>
+        <p:nvSpPr>
+          <p:cNvPr id="3" name="日期占位符 2"/>
+          <p:cNvSpPr>
+            <a:spLocks noGrp="1"/>
+          </p:cNvSpPr>
+          <p:nvPr>
+            <p:ph type="dt" sz="quarter" idx="1"/>
+          </p:nvPr>
+        </p:nvSpPr>
+        <p:spPr>
+          <a:xfrm>
+            <a:off x="3884613" y="0"/>
+            <a:ext cx="2971800" cy="458788"/>
+          </a:xfrm>
+          <a:prstGeom prst="rect">
+            <a:avLst/>
+          </a:prstGeom>
+        </p:spPr>
+        <p:txBody>
+          <a:bodyPr vert="horz" lIns="91440" tIns="45720" rIns="91440" bIns="45720" rtlCol="0"/>
+          <a:lstStyle>
+            <a:lvl1pPr algn="r">
+              <a:defRPr sz="1200"/>
+            </a:lvl1pPr>
+          </a:lstStyle>
+          <a:p>
+            <a:fld id="{0F9B84EA-7D68-4D60-9CB1-D50884785D1C}" type="datetimeFigureOut">
+              <a:rPr lang="zh-CN" altLang="en-US" smtClean="0"/>
+              <a:t>2025/5/25</a:t>
+            </a:fld>
+            <a:endParaRPr lang="zh-CN" altLang="en-US"/>
+          </a:p>
+        </p:txBody>
+      </p:sp>
+      <p:sp>
+        <p:nvSpPr>
+          <p:cNvPr id="4" name="页脚占位符 3"/>
+          <p:cNvSpPr>
+            <a:spLocks noGrp="1"/>
+          </p:cNvSpPr>
+          <p:nvPr>
+            <p:ph type="ftr" sz="quarter" idx="2"/>
+          </p:nvPr>
+        </p:nvSpPr>
+        <p:spPr>
+          <a:xfrm>
+            <a:off x="0" y="8685213"/>
+            <a:ext cx="2971800" cy="458787"/>
+          </a:xfrm>
+          <a:prstGeom prst="rect">
+            <a:avLst/>
+          </a:prstGeom>
+        </p:spPr>
+        <p:txBody>
+          <a:bodyPr vert="horz" lIns="91440" tIns="45720" rIns="91440" bIns="45720" rtlCol="0" anchor="b"/>
+          <a:lstStyle>
+            <a:lvl1pPr algn="l">
+              <a:defRPr sz="1200"/>
+            </a:lvl1pPr>
+          </a:lstStyle>
+          <a:p>
+            <a:endParaRPr lang="zh-CN" altLang="en-US"/>
+          </a:p>
+        </p:txBody>
+      </p:sp>
+      <p:sp>
+        <p:nvSpPr>
+          <p:cNvPr id="5" name="灯片编号占位符 4"/>
+          <p:cNvSpPr>
+            <a:spLocks noGrp="1"/>
+          </p:cNvSpPr>
+          <p:nvPr>
+            <p:ph type="sldNum" sz="quarter" idx="3"/>
+          </p:nvPr>
+        </p:nvSpPr>
+        <p:spPr>
+          <a:xfrm>
+            <a:off x="3884613" y="8685213"/>
+            <a:ext cx="2971800" cy="458787"/>
+          </a:xfrm>
+          <a:prstGeom prst="rect">
+            <a:avLst/>
+          </a:prstGeom>
+        </p:spPr>
+        <p:txBody>
+          <a:bodyPr vert="horz" lIns="91440" tIns="45720" rIns="91440" bIns="45720" rtlCol="0" anchor="b"/>
+          <a:lstStyle>
+            <a:lvl1pPr algn="r">
+              <a:defRPr sz="1200"/>
+            </a:lvl1pPr>
+          </a:lstStyle>
+          <a:p>
+            <a:fld id="{8D4E0FC9-F1F8-4FAE-9988-3BA365CFD46F}" type="slidenum">
+              <a:rPr lang="zh-CN" altLang="en-US" smtClean="0"/>
+              <a:t>‹#›</a:t>
+            </a:fld>
+            <a:endParaRPr lang="zh-CN" altLang="en-US"/>
+          </a:p>
+        </p:txBody>
+      </p:sp>
+    </p:spTree>
+    <p:extLst>
+      <p:ext uri="{BB962C8B-B14F-4D97-AF65-F5344CB8AC3E}">
+        <p14:creationId xmlns:p14="http://schemas.microsoft.com/office/powerpoint/2010/main" val="1"/>
+      </p:ext>
+    </p:extLst>
+  </p:cSld>
+  <p:clrMap bg1="lt1" tx1="dk1" bg2="lt2" tx2="dk2" accent1="accent1" accent2="accent2" accent3="accent3" accent4="accent4" accent5="accent5" accent6="accent6" hlink="hlink" folHlink="folHlink"/>
+</p:handoutMaster>
 </file>
 
 <file path=ppt/notesMasters/notesMaster1.xml><?xml version="1.0" encoding="utf-8"?>
@@ -256,6 +427,7 @@
           <a:p>
             <a:fld id="{373AEA94-00EF-4DE4-8FA3-F9ECAA6DD2CF}" type="datetimeFigureOut">
               <a:rPr lang="zh-CN" altLang="en-US" smtClean="0"/>
+              <a:t>2025/5/25</a:t>
             </a:fld>
             <a:endParaRPr lang="zh-CN" altLang="en-US"/>
           </a:p>
@@ -322,7 +494,6 @@
               <a:rPr lang="zh-CN" altLang="en-US"/>
               <a:t>单击此处编辑母版文本样式</a:t>
             </a:r>
-            <a:endParaRPr lang="zh-CN" altLang="en-US"/>
           </a:p>
           <a:p>
             <a:pPr lvl="1"/>
@@ -330,7 +501,6 @@
               <a:rPr lang="zh-CN" altLang="en-US"/>
               <a:t>二级</a:t>
             </a:r>
-            <a:endParaRPr lang="zh-CN" altLang="en-US"/>
           </a:p>
           <a:p>
             <a:pPr lvl="2"/>
@@ -338,7 +508,6 @@
               <a:rPr lang="zh-CN" altLang="en-US"/>
               <a:t>三级</a:t>
             </a:r>
-            <a:endParaRPr lang="zh-CN" altLang="en-US"/>
           </a:p>
           <a:p>
             <a:pPr lvl="3"/>
@@ -346,7 +515,6 @@
               <a:rPr lang="zh-CN" altLang="en-US"/>
               <a:t>四级</a:t>
             </a:r>
-            <a:endParaRPr lang="zh-CN" altLang="en-US"/>
           </a:p>
           <a:p>
             <a:pPr lvl="4"/>
@@ -354,7 +522,6 @@
               <a:rPr lang="zh-CN" altLang="en-US"/>
               <a:t>五级</a:t>
             </a:r>
-            <a:endParaRPr lang="zh-CN" altLang="en-US"/>
           </a:p>
         </p:txBody>
       </p:sp>
@@ -418,6 +585,7 @@
           <a:p>
             <a:fld id="{8F8145D6-6EE7-4E56-9B77-0EB069CF9533}" type="slidenum">
               <a:rPr lang="zh-CN" altLang="en-US" smtClean="0"/>
+              <a:t>‹#›</a:t>
             </a:fld>
             <a:endParaRPr lang="zh-CN" altLang="en-US"/>
           </a:p>
@@ -615,6 +783,7 @@
                 <a:ea typeface="等线" panose="02010600030101010101" charset="-122"/>
                 <a:cs typeface="+mn-cs"/>
               </a:rPr>
+              <a:t>1</a:t>
             </a:fld>
             <a:endParaRPr kumimoji="0" lang="zh-CN" altLang="en-US" sz="1200" b="0" i="0" u="none" strike="noStrike" kern="1200" cap="none" spc="0" normalizeH="0" baseline="0" noProof="0">
               <a:ln>
@@ -706,6 +875,7 @@
           <a:p>
             <a:fld id="{8F8145D6-6EE7-4E56-9B77-0EB069CF9533}" type="slidenum">
               <a:rPr lang="zh-CN" altLang="en-US" smtClean="0"/>
+              <a:t>2</a:t>
             </a:fld>
             <a:endParaRPr lang="zh-CN" altLang="en-US"/>
           </a:p>
@@ -813,6 +983,7 @@
                 <a:ea typeface="等线" panose="02010600030101010101" charset="-122"/>
                 <a:cs typeface="+mn-cs"/>
               </a:rPr>
+              <a:t>3</a:t>
             </a:fld>
             <a:endParaRPr kumimoji="0" lang="zh-CN" altLang="en-US" sz="1200" b="0" i="0" u="none" strike="noStrike" kern="1200" cap="none" spc="0" normalizeH="0" baseline="0" noProof="0">
               <a:ln>
@@ -933,6 +1104,7 @@
                 <a:ea typeface="等线" panose="02010600030101010101" charset="-122"/>
                 <a:cs typeface="+mn-cs"/>
               </a:rPr>
+              <a:t>4</a:t>
             </a:fld>
             <a:endParaRPr kumimoji="0" lang="zh-CN" altLang="en-US" sz="1200" b="0" i="0" u="none" strike="noStrike" kern="1200" cap="none" spc="0" normalizeH="0" baseline="0" noProof="0">
               <a:ln>
@@ -1004,7 +1176,6 @@
               <a:rPr lang="zh-CN" altLang="en-US"/>
               <a:t>单击此处编辑母版标题样式</a:t>
             </a:r>
-            <a:endParaRPr lang="zh-CN" altLang="en-US"/>
           </a:p>
         </p:txBody>
       </p:sp>
@@ -1069,7 +1240,6 @@
               <a:rPr lang="zh-CN" altLang="en-US"/>
               <a:t>单击此处编辑母版副标题样式</a:t>
             </a:r>
-            <a:endParaRPr lang="zh-CN" altLang="en-US"/>
           </a:p>
         </p:txBody>
       </p:sp>
@@ -1090,6 +1260,7 @@
           <a:p>
             <a:fld id="{E45C1C0B-BEED-40A4-BB03-2B5E358FDD63}" type="datetimeFigureOut">
               <a:rPr lang="zh-CN" altLang="en-US" smtClean="0"/>
+              <a:t>2025/5/25</a:t>
             </a:fld>
             <a:endParaRPr lang="zh-CN" altLang="en-US"/>
           </a:p>
@@ -1131,6 +1302,7 @@
           <a:p>
             <a:fld id="{8868DC54-BAD1-41E2-8A34-E4BFC1AB4FEC}" type="slidenum">
               <a:rPr lang="zh-CN" altLang="en-US" smtClean="0"/>
+              <a:t>‹#›</a:t>
             </a:fld>
             <a:endParaRPr lang="zh-CN" altLang="en-US"/>
           </a:p>
@@ -1180,7 +1352,6 @@
               <a:rPr lang="zh-CN" altLang="en-US"/>
               <a:t>单击此处编辑母版标题样式</a:t>
             </a:r>
-            <a:endParaRPr lang="zh-CN" altLang="en-US"/>
           </a:p>
         </p:txBody>
       </p:sp>
@@ -1204,7 +1375,6 @@
               <a:rPr lang="zh-CN" altLang="en-US"/>
               <a:t>单击此处编辑母版文本样式</a:t>
             </a:r>
-            <a:endParaRPr lang="zh-CN" altLang="en-US"/>
           </a:p>
           <a:p>
             <a:pPr lvl="1"/>
@@ -1212,7 +1382,6 @@
               <a:rPr lang="zh-CN" altLang="en-US"/>
               <a:t>二级</a:t>
             </a:r>
-            <a:endParaRPr lang="zh-CN" altLang="en-US"/>
           </a:p>
           <a:p>
             <a:pPr lvl="2"/>
@@ -1220,7 +1389,6 @@
               <a:rPr lang="zh-CN" altLang="en-US"/>
               <a:t>三级</a:t>
             </a:r>
-            <a:endParaRPr lang="zh-CN" altLang="en-US"/>
           </a:p>
           <a:p>
             <a:pPr lvl="3"/>
@@ -1228,7 +1396,6 @@
               <a:rPr lang="zh-CN" altLang="en-US"/>
               <a:t>四级</a:t>
             </a:r>
-            <a:endParaRPr lang="zh-CN" altLang="en-US"/>
           </a:p>
           <a:p>
             <a:pPr lvl="4"/>
@@ -1236,7 +1403,6 @@
               <a:rPr lang="zh-CN" altLang="en-US"/>
               <a:t>五级</a:t>
             </a:r>
-            <a:endParaRPr lang="zh-CN" altLang="en-US"/>
           </a:p>
         </p:txBody>
       </p:sp>
@@ -1257,6 +1423,7 @@
           <a:p>
             <a:fld id="{E45C1C0B-BEED-40A4-BB03-2B5E358FDD63}" type="datetimeFigureOut">
               <a:rPr lang="zh-CN" altLang="en-US" smtClean="0"/>
+              <a:t>2025/5/25</a:t>
             </a:fld>
             <a:endParaRPr lang="zh-CN" altLang="en-US"/>
           </a:p>
@@ -1298,6 +1465,7 @@
           <a:p>
             <a:fld id="{8868DC54-BAD1-41E2-8A34-E4BFC1AB4FEC}" type="slidenum">
               <a:rPr lang="zh-CN" altLang="en-US" smtClean="0"/>
+              <a:t>‹#›</a:t>
             </a:fld>
             <a:endParaRPr lang="zh-CN" altLang="en-US"/>
           </a:p>
@@ -1352,7 +1520,6 @@
               <a:rPr lang="zh-CN" altLang="en-US"/>
               <a:t>单击此处编辑母版标题样式</a:t>
             </a:r>
-            <a:endParaRPr lang="zh-CN" altLang="en-US"/>
           </a:p>
         </p:txBody>
       </p:sp>
@@ -1381,7 +1548,6 @@
               <a:rPr lang="zh-CN" altLang="en-US"/>
               <a:t>单击此处编辑母版文本样式</a:t>
             </a:r>
-            <a:endParaRPr lang="zh-CN" altLang="en-US"/>
           </a:p>
           <a:p>
             <a:pPr lvl="1"/>
@@ -1389,7 +1555,6 @@
               <a:rPr lang="zh-CN" altLang="en-US"/>
               <a:t>二级</a:t>
             </a:r>
-            <a:endParaRPr lang="zh-CN" altLang="en-US"/>
           </a:p>
           <a:p>
             <a:pPr lvl="2"/>
@@ -1397,7 +1562,6 @@
               <a:rPr lang="zh-CN" altLang="en-US"/>
               <a:t>三级</a:t>
             </a:r>
-            <a:endParaRPr lang="zh-CN" altLang="en-US"/>
           </a:p>
           <a:p>
             <a:pPr lvl="3"/>
@@ -1405,7 +1569,6 @@
               <a:rPr lang="zh-CN" altLang="en-US"/>
               <a:t>四级</a:t>
             </a:r>
-            <a:endParaRPr lang="zh-CN" altLang="en-US"/>
           </a:p>
           <a:p>
             <a:pPr lvl="4"/>
@@ -1413,7 +1576,6 @@
               <a:rPr lang="zh-CN" altLang="en-US"/>
               <a:t>五级</a:t>
             </a:r>
-            <a:endParaRPr lang="zh-CN" altLang="en-US"/>
           </a:p>
         </p:txBody>
       </p:sp>
@@ -1434,6 +1596,7 @@
           <a:p>
             <a:fld id="{E45C1C0B-BEED-40A4-BB03-2B5E358FDD63}" type="datetimeFigureOut">
               <a:rPr lang="zh-CN" altLang="en-US" smtClean="0"/>
+              <a:t>2025/5/25</a:t>
             </a:fld>
             <a:endParaRPr lang="zh-CN" altLang="en-US"/>
           </a:p>
@@ -1475,6 +1638,7 @@
           <a:p>
             <a:fld id="{8868DC54-BAD1-41E2-8A34-E4BFC1AB4FEC}" type="slidenum">
               <a:rPr lang="zh-CN" altLang="en-US" smtClean="0"/>
+              <a:t>‹#›</a:t>
             </a:fld>
             <a:endParaRPr lang="zh-CN" altLang="en-US"/>
           </a:p>
@@ -1533,7 +1697,6 @@
               <a:rPr lang="zh-CN" altLang="en-US"/>
               <a:t>单击此处编辑母版标题样式</a:t>
             </a:r>
-            <a:endParaRPr lang="zh-CN" altLang="en-US"/>
           </a:p>
         </p:txBody>
       </p:sp>
@@ -1598,7 +1761,6 @@
               <a:rPr lang="zh-CN" altLang="en-US"/>
               <a:t>单击此处编辑母版副标题样式</a:t>
             </a:r>
-            <a:endParaRPr lang="zh-CN" altLang="en-US"/>
           </a:p>
         </p:txBody>
       </p:sp>
@@ -1619,6 +1781,7 @@
           <a:p>
             <a:fld id="{E45C1C0B-BEED-40A4-BB03-2B5E358FDD63}" type="datetimeFigureOut">
               <a:rPr lang="zh-CN" altLang="en-US" smtClean="0"/>
+              <a:t>2025/5/25</a:t>
             </a:fld>
             <a:endParaRPr lang="zh-CN" altLang="en-US"/>
           </a:p>
@@ -1660,6 +1823,7 @@
           <a:p>
             <a:fld id="{8868DC54-BAD1-41E2-8A34-E4BFC1AB4FEC}" type="slidenum">
               <a:rPr lang="zh-CN" altLang="en-US" smtClean="0"/>
+              <a:t>‹#›</a:t>
             </a:fld>
             <a:endParaRPr lang="zh-CN" altLang="en-US"/>
           </a:p>
@@ -1709,7 +1873,6 @@
               <a:rPr lang="zh-CN" altLang="en-US"/>
               <a:t>单击此处编辑母版标题样式</a:t>
             </a:r>
-            <a:endParaRPr lang="zh-CN" altLang="en-US"/>
           </a:p>
         </p:txBody>
       </p:sp>
@@ -1733,7 +1896,6 @@
               <a:rPr lang="zh-CN" altLang="en-US"/>
               <a:t>单击此处编辑母版文本样式</a:t>
             </a:r>
-            <a:endParaRPr lang="zh-CN" altLang="en-US"/>
           </a:p>
           <a:p>
             <a:pPr lvl="1"/>
@@ -1741,7 +1903,6 @@
               <a:rPr lang="zh-CN" altLang="en-US"/>
               <a:t>二级</a:t>
             </a:r>
-            <a:endParaRPr lang="zh-CN" altLang="en-US"/>
           </a:p>
           <a:p>
             <a:pPr lvl="2"/>
@@ -1749,7 +1910,6 @@
               <a:rPr lang="zh-CN" altLang="en-US"/>
               <a:t>三级</a:t>
             </a:r>
-            <a:endParaRPr lang="zh-CN" altLang="en-US"/>
           </a:p>
           <a:p>
             <a:pPr lvl="3"/>
@@ -1757,7 +1917,6 @@
               <a:rPr lang="zh-CN" altLang="en-US"/>
               <a:t>四级</a:t>
             </a:r>
-            <a:endParaRPr lang="zh-CN" altLang="en-US"/>
           </a:p>
           <a:p>
             <a:pPr lvl="4"/>
@@ -1765,7 +1924,6 @@
               <a:rPr lang="zh-CN" altLang="en-US"/>
               <a:t>五级</a:t>
             </a:r>
-            <a:endParaRPr lang="zh-CN" altLang="en-US"/>
           </a:p>
         </p:txBody>
       </p:sp>
@@ -1786,6 +1944,7 @@
           <a:p>
             <a:fld id="{E45C1C0B-BEED-40A4-BB03-2B5E358FDD63}" type="datetimeFigureOut">
               <a:rPr lang="zh-CN" altLang="en-US" smtClean="0"/>
+              <a:t>2025/5/25</a:t>
             </a:fld>
             <a:endParaRPr lang="zh-CN" altLang="en-US"/>
           </a:p>
@@ -1827,6 +1986,7 @@
           <a:p>
             <a:fld id="{8868DC54-BAD1-41E2-8A34-E4BFC1AB4FEC}" type="slidenum">
               <a:rPr lang="zh-CN" altLang="en-US" smtClean="0"/>
+              <a:t>‹#›</a:t>
             </a:fld>
             <a:endParaRPr lang="zh-CN" altLang="en-US"/>
           </a:p>
@@ -1885,7 +2045,6 @@
               <a:rPr lang="zh-CN" altLang="en-US"/>
               <a:t>单击此处编辑母版标题样式</a:t>
             </a:r>
-            <a:endParaRPr lang="zh-CN" altLang="en-US"/>
           </a:p>
         </p:txBody>
       </p:sp>
@@ -2005,7 +2164,6 @@
               <a:rPr lang="zh-CN" altLang="en-US"/>
               <a:t>单击此处编辑母版文本样式</a:t>
             </a:r>
-            <a:endParaRPr lang="zh-CN" altLang="en-US"/>
           </a:p>
         </p:txBody>
       </p:sp>
@@ -2026,6 +2184,7 @@
           <a:p>
             <a:fld id="{E45C1C0B-BEED-40A4-BB03-2B5E358FDD63}" type="datetimeFigureOut">
               <a:rPr lang="zh-CN" altLang="en-US" smtClean="0"/>
+              <a:t>2025/5/25</a:t>
             </a:fld>
             <a:endParaRPr lang="zh-CN" altLang="en-US"/>
           </a:p>
@@ -2067,6 +2226,7 @@
           <a:p>
             <a:fld id="{8868DC54-BAD1-41E2-8A34-E4BFC1AB4FEC}" type="slidenum">
               <a:rPr lang="zh-CN" altLang="en-US" smtClean="0"/>
+              <a:t>‹#›</a:t>
             </a:fld>
             <a:endParaRPr lang="zh-CN" altLang="en-US"/>
           </a:p>
@@ -2116,7 +2276,6 @@
               <a:rPr lang="zh-CN" altLang="en-US"/>
               <a:t>单击此处编辑母版标题样式</a:t>
             </a:r>
-            <a:endParaRPr lang="zh-CN" altLang="en-US"/>
           </a:p>
         </p:txBody>
       </p:sp>
@@ -2145,7 +2304,6 @@
               <a:rPr lang="zh-CN" altLang="en-US"/>
               <a:t>单击此处编辑母版文本样式</a:t>
             </a:r>
-            <a:endParaRPr lang="zh-CN" altLang="en-US"/>
           </a:p>
           <a:p>
             <a:pPr lvl="1"/>
@@ -2153,7 +2311,6 @@
               <a:rPr lang="zh-CN" altLang="en-US"/>
               <a:t>二级</a:t>
             </a:r>
-            <a:endParaRPr lang="zh-CN" altLang="en-US"/>
           </a:p>
           <a:p>
             <a:pPr lvl="2"/>
@@ -2161,7 +2318,6 @@
               <a:rPr lang="zh-CN" altLang="en-US"/>
               <a:t>三级</a:t>
             </a:r>
-            <a:endParaRPr lang="zh-CN" altLang="en-US"/>
           </a:p>
           <a:p>
             <a:pPr lvl="3"/>
@@ -2169,7 +2325,6 @@
               <a:rPr lang="zh-CN" altLang="en-US"/>
               <a:t>四级</a:t>
             </a:r>
-            <a:endParaRPr lang="zh-CN" altLang="en-US"/>
           </a:p>
           <a:p>
             <a:pPr lvl="4"/>
@@ -2177,7 +2332,6 @@
               <a:rPr lang="zh-CN" altLang="en-US"/>
               <a:t>五级</a:t>
             </a:r>
-            <a:endParaRPr lang="zh-CN" altLang="en-US"/>
           </a:p>
         </p:txBody>
       </p:sp>
@@ -2206,7 +2360,6 @@
               <a:rPr lang="zh-CN" altLang="en-US"/>
               <a:t>单击此处编辑母版文本样式</a:t>
             </a:r>
-            <a:endParaRPr lang="zh-CN" altLang="en-US"/>
           </a:p>
           <a:p>
             <a:pPr lvl="1"/>
@@ -2214,7 +2367,6 @@
               <a:rPr lang="zh-CN" altLang="en-US"/>
               <a:t>二级</a:t>
             </a:r>
-            <a:endParaRPr lang="zh-CN" altLang="en-US"/>
           </a:p>
           <a:p>
             <a:pPr lvl="2"/>
@@ -2222,7 +2374,6 @@
               <a:rPr lang="zh-CN" altLang="en-US"/>
               <a:t>三级</a:t>
             </a:r>
-            <a:endParaRPr lang="zh-CN" altLang="en-US"/>
           </a:p>
           <a:p>
             <a:pPr lvl="3"/>
@@ -2230,7 +2381,6 @@
               <a:rPr lang="zh-CN" altLang="en-US"/>
               <a:t>四级</a:t>
             </a:r>
-            <a:endParaRPr lang="zh-CN" altLang="en-US"/>
           </a:p>
           <a:p>
             <a:pPr lvl="4"/>
@@ -2238,7 +2388,6 @@
               <a:rPr lang="zh-CN" altLang="en-US"/>
               <a:t>五级</a:t>
             </a:r>
-            <a:endParaRPr lang="zh-CN" altLang="en-US"/>
           </a:p>
         </p:txBody>
       </p:sp>
@@ -2259,6 +2408,7 @@
           <a:p>
             <a:fld id="{E45C1C0B-BEED-40A4-BB03-2B5E358FDD63}" type="datetimeFigureOut">
               <a:rPr lang="zh-CN" altLang="en-US" smtClean="0"/>
+              <a:t>2025/5/25</a:t>
             </a:fld>
             <a:endParaRPr lang="zh-CN" altLang="en-US"/>
           </a:p>
@@ -2300,6 +2450,7 @@
           <a:p>
             <a:fld id="{8868DC54-BAD1-41E2-8A34-E4BFC1AB4FEC}" type="slidenum">
               <a:rPr lang="zh-CN" altLang="en-US" smtClean="0"/>
+              <a:t>‹#›</a:t>
             </a:fld>
             <a:endParaRPr lang="zh-CN" altLang="en-US"/>
           </a:p>
@@ -2354,7 +2505,6 @@
               <a:rPr lang="zh-CN" altLang="en-US"/>
               <a:t>单击此处编辑母版标题样式</a:t>
             </a:r>
-            <a:endParaRPr lang="zh-CN" altLang="en-US"/>
           </a:p>
         </p:txBody>
       </p:sp>
@@ -2420,7 +2570,6 @@
               <a:rPr lang="zh-CN" altLang="en-US"/>
               <a:t>单击此处编辑母版文本样式</a:t>
             </a:r>
-            <a:endParaRPr lang="zh-CN" altLang="en-US"/>
           </a:p>
         </p:txBody>
       </p:sp>
@@ -2449,7 +2598,6 @@
               <a:rPr lang="zh-CN" altLang="en-US"/>
               <a:t>单击此处编辑母版文本样式</a:t>
             </a:r>
-            <a:endParaRPr lang="zh-CN" altLang="en-US"/>
           </a:p>
           <a:p>
             <a:pPr lvl="1"/>
@@ -2457,7 +2605,6 @@
               <a:rPr lang="zh-CN" altLang="en-US"/>
               <a:t>二级</a:t>
             </a:r>
-            <a:endParaRPr lang="zh-CN" altLang="en-US"/>
           </a:p>
           <a:p>
             <a:pPr lvl="2"/>
@@ -2465,7 +2612,6 @@
               <a:rPr lang="zh-CN" altLang="en-US"/>
               <a:t>三级</a:t>
             </a:r>
-            <a:endParaRPr lang="zh-CN" altLang="en-US"/>
           </a:p>
           <a:p>
             <a:pPr lvl="3"/>
@@ -2473,7 +2619,6 @@
               <a:rPr lang="zh-CN" altLang="en-US"/>
               <a:t>四级</a:t>
             </a:r>
-            <a:endParaRPr lang="zh-CN" altLang="en-US"/>
           </a:p>
           <a:p>
             <a:pPr lvl="4"/>
@@ -2481,7 +2626,6 @@
               <a:rPr lang="zh-CN" altLang="en-US"/>
               <a:t>五级</a:t>
             </a:r>
-            <a:endParaRPr lang="zh-CN" altLang="en-US"/>
           </a:p>
         </p:txBody>
       </p:sp>
@@ -2547,7 +2691,6 @@
               <a:rPr lang="zh-CN" altLang="en-US"/>
               <a:t>单击此处编辑母版文本样式</a:t>
             </a:r>
-            <a:endParaRPr lang="zh-CN" altLang="en-US"/>
           </a:p>
         </p:txBody>
       </p:sp>
@@ -2576,7 +2719,6 @@
               <a:rPr lang="zh-CN" altLang="en-US"/>
               <a:t>单击此处编辑母版文本样式</a:t>
             </a:r>
-            <a:endParaRPr lang="zh-CN" altLang="en-US"/>
           </a:p>
           <a:p>
             <a:pPr lvl="1"/>
@@ -2584,7 +2726,6 @@
               <a:rPr lang="zh-CN" altLang="en-US"/>
               <a:t>二级</a:t>
             </a:r>
-            <a:endParaRPr lang="zh-CN" altLang="en-US"/>
           </a:p>
           <a:p>
             <a:pPr lvl="2"/>
@@ -2592,7 +2733,6 @@
               <a:rPr lang="zh-CN" altLang="en-US"/>
               <a:t>三级</a:t>
             </a:r>
-            <a:endParaRPr lang="zh-CN" altLang="en-US"/>
           </a:p>
           <a:p>
             <a:pPr lvl="3"/>
@@ -2600,7 +2740,6 @@
               <a:rPr lang="zh-CN" altLang="en-US"/>
               <a:t>四级</a:t>
             </a:r>
-            <a:endParaRPr lang="zh-CN" altLang="en-US"/>
           </a:p>
           <a:p>
             <a:pPr lvl="4"/>
@@ -2608,7 +2747,6 @@
               <a:rPr lang="zh-CN" altLang="en-US"/>
               <a:t>五级</a:t>
             </a:r>
-            <a:endParaRPr lang="zh-CN" altLang="en-US"/>
           </a:p>
         </p:txBody>
       </p:sp>
@@ -2629,6 +2767,7 @@
           <a:p>
             <a:fld id="{E45C1C0B-BEED-40A4-BB03-2B5E358FDD63}" type="datetimeFigureOut">
               <a:rPr lang="zh-CN" altLang="en-US" smtClean="0"/>
+              <a:t>2025/5/25</a:t>
             </a:fld>
             <a:endParaRPr lang="zh-CN" altLang="en-US"/>
           </a:p>
@@ -2670,6 +2809,7 @@
           <a:p>
             <a:fld id="{8868DC54-BAD1-41E2-8A34-E4BFC1AB4FEC}" type="slidenum">
               <a:rPr lang="zh-CN" altLang="en-US" smtClean="0"/>
+              <a:t>‹#›</a:t>
             </a:fld>
             <a:endParaRPr lang="zh-CN" altLang="en-US"/>
           </a:p>
@@ -2719,7 +2859,6 @@
               <a:rPr lang="zh-CN" altLang="en-US"/>
               <a:t>单击此处编辑母版标题样式</a:t>
             </a:r>
-            <a:endParaRPr lang="zh-CN" altLang="en-US"/>
           </a:p>
         </p:txBody>
       </p:sp>
@@ -2740,6 +2879,7 @@
           <a:p>
             <a:fld id="{E45C1C0B-BEED-40A4-BB03-2B5E358FDD63}" type="datetimeFigureOut">
               <a:rPr lang="zh-CN" altLang="en-US" smtClean="0"/>
+              <a:t>2025/5/25</a:t>
             </a:fld>
             <a:endParaRPr lang="zh-CN" altLang="en-US"/>
           </a:p>
@@ -2781,6 +2921,7 @@
           <a:p>
             <a:fld id="{8868DC54-BAD1-41E2-8A34-E4BFC1AB4FEC}" type="slidenum">
               <a:rPr lang="zh-CN" altLang="en-US" smtClean="0"/>
+              <a:t>‹#›</a:t>
             </a:fld>
             <a:endParaRPr lang="zh-CN" altLang="en-US"/>
           </a:p>
@@ -2828,6 +2969,7 @@
           <a:p>
             <a:fld id="{E45C1C0B-BEED-40A4-BB03-2B5E358FDD63}" type="datetimeFigureOut">
               <a:rPr lang="zh-CN" altLang="en-US" smtClean="0"/>
+              <a:t>2025/5/25</a:t>
             </a:fld>
             <a:endParaRPr lang="zh-CN" altLang="en-US"/>
           </a:p>
@@ -2869,6 +3011,7 @@
           <a:p>
             <a:fld id="{8868DC54-BAD1-41E2-8A34-E4BFC1AB4FEC}" type="slidenum">
               <a:rPr lang="zh-CN" altLang="en-US" smtClean="0"/>
+              <a:t>‹#›</a:t>
             </a:fld>
             <a:endParaRPr lang="zh-CN" altLang="en-US"/>
           </a:p>
@@ -2927,7 +3070,6 @@
               <a:rPr lang="zh-CN" altLang="en-US"/>
               <a:t>单击此处编辑母版标题样式</a:t>
             </a:r>
-            <a:endParaRPr lang="zh-CN" altLang="en-US"/>
           </a:p>
         </p:txBody>
       </p:sp>
@@ -2984,7 +3126,6 @@
               <a:rPr lang="zh-CN" altLang="en-US"/>
               <a:t>单击此处编辑母版文本样式</a:t>
             </a:r>
-            <a:endParaRPr lang="zh-CN" altLang="en-US"/>
           </a:p>
           <a:p>
             <a:pPr lvl="1"/>
@@ -2992,7 +3133,6 @@
               <a:rPr lang="zh-CN" altLang="en-US"/>
               <a:t>二级</a:t>
             </a:r>
-            <a:endParaRPr lang="zh-CN" altLang="en-US"/>
           </a:p>
           <a:p>
             <a:pPr lvl="2"/>
@@ -3000,7 +3140,6 @@
               <a:rPr lang="zh-CN" altLang="en-US"/>
               <a:t>三级</a:t>
             </a:r>
-            <a:endParaRPr lang="zh-CN" altLang="en-US"/>
           </a:p>
           <a:p>
             <a:pPr lvl="3"/>
@@ -3008,7 +3147,6 @@
               <a:rPr lang="zh-CN" altLang="en-US"/>
               <a:t>四级</a:t>
             </a:r>
-            <a:endParaRPr lang="zh-CN" altLang="en-US"/>
           </a:p>
           <a:p>
             <a:pPr lvl="4"/>
@@ -3016,7 +3154,6 @@
               <a:rPr lang="zh-CN" altLang="en-US"/>
               <a:t>五级</a:t>
             </a:r>
-            <a:endParaRPr lang="zh-CN" altLang="en-US"/>
           </a:p>
         </p:txBody>
       </p:sp>
@@ -3082,7 +3219,6 @@
               <a:rPr lang="zh-CN" altLang="en-US"/>
               <a:t>单击此处编辑母版文本样式</a:t>
             </a:r>
-            <a:endParaRPr lang="zh-CN" altLang="en-US"/>
           </a:p>
         </p:txBody>
       </p:sp>
@@ -3103,6 +3239,7 @@
           <a:p>
             <a:fld id="{E45C1C0B-BEED-40A4-BB03-2B5E358FDD63}" type="datetimeFigureOut">
               <a:rPr lang="zh-CN" altLang="en-US" smtClean="0"/>
+              <a:t>2025/5/25</a:t>
             </a:fld>
             <a:endParaRPr lang="zh-CN" altLang="en-US"/>
           </a:p>
@@ -3144,6 +3281,7 @@
           <a:p>
             <a:fld id="{8868DC54-BAD1-41E2-8A34-E4BFC1AB4FEC}" type="slidenum">
               <a:rPr lang="zh-CN" altLang="en-US" smtClean="0"/>
+              <a:t>‹#›</a:t>
             </a:fld>
             <a:endParaRPr lang="zh-CN" altLang="en-US"/>
           </a:p>
@@ -3193,7 +3331,6 @@
               <a:rPr lang="zh-CN" altLang="en-US"/>
               <a:t>单击此处编辑母版标题样式</a:t>
             </a:r>
-            <a:endParaRPr lang="zh-CN" altLang="en-US"/>
           </a:p>
         </p:txBody>
       </p:sp>
@@ -3217,7 +3354,6 @@
               <a:rPr lang="zh-CN" altLang="en-US"/>
               <a:t>单击此处编辑母版文本样式</a:t>
             </a:r>
-            <a:endParaRPr lang="zh-CN" altLang="en-US"/>
           </a:p>
           <a:p>
             <a:pPr lvl="1"/>
@@ -3225,7 +3361,6 @@
               <a:rPr lang="zh-CN" altLang="en-US"/>
               <a:t>二级</a:t>
             </a:r>
-            <a:endParaRPr lang="zh-CN" altLang="en-US"/>
           </a:p>
           <a:p>
             <a:pPr lvl="2"/>
@@ -3233,7 +3368,6 @@
               <a:rPr lang="zh-CN" altLang="en-US"/>
               <a:t>三级</a:t>
             </a:r>
-            <a:endParaRPr lang="zh-CN" altLang="en-US"/>
           </a:p>
           <a:p>
             <a:pPr lvl="3"/>
@@ -3241,7 +3375,6 @@
               <a:rPr lang="zh-CN" altLang="en-US"/>
               <a:t>四级</a:t>
             </a:r>
-            <a:endParaRPr lang="zh-CN" altLang="en-US"/>
           </a:p>
           <a:p>
             <a:pPr lvl="4"/>
@@ -3249,7 +3382,6 @@
               <a:rPr lang="zh-CN" altLang="en-US"/>
               <a:t>五级</a:t>
             </a:r>
-            <a:endParaRPr lang="zh-CN" altLang="en-US"/>
           </a:p>
         </p:txBody>
       </p:sp>
@@ -3270,6 +3402,7 @@
           <a:p>
             <a:fld id="{E45C1C0B-BEED-40A4-BB03-2B5E358FDD63}" type="datetimeFigureOut">
               <a:rPr lang="zh-CN" altLang="en-US" smtClean="0"/>
+              <a:t>2025/5/25</a:t>
             </a:fld>
             <a:endParaRPr lang="zh-CN" altLang="en-US"/>
           </a:p>
@@ -3311,6 +3444,7 @@
           <a:p>
             <a:fld id="{8868DC54-BAD1-41E2-8A34-E4BFC1AB4FEC}" type="slidenum">
               <a:rPr lang="zh-CN" altLang="en-US" smtClean="0"/>
+              <a:t>‹#›</a:t>
             </a:fld>
             <a:endParaRPr lang="zh-CN" altLang="en-US"/>
           </a:p>
@@ -3369,7 +3503,6 @@
               <a:rPr lang="zh-CN" altLang="en-US"/>
               <a:t>单击此处编辑母版标题样式</a:t>
             </a:r>
-            <a:endParaRPr lang="zh-CN" altLang="en-US"/>
           </a:p>
         </p:txBody>
       </p:sp>
@@ -3496,7 +3629,6 @@
               <a:rPr lang="zh-CN" altLang="en-US"/>
               <a:t>单击此处编辑母版文本样式</a:t>
             </a:r>
-            <a:endParaRPr lang="zh-CN" altLang="en-US"/>
           </a:p>
         </p:txBody>
       </p:sp>
@@ -3517,6 +3649,7 @@
           <a:p>
             <a:fld id="{E45C1C0B-BEED-40A4-BB03-2B5E358FDD63}" type="datetimeFigureOut">
               <a:rPr lang="zh-CN" altLang="en-US" smtClean="0"/>
+              <a:t>2025/5/25</a:t>
             </a:fld>
             <a:endParaRPr lang="zh-CN" altLang="en-US"/>
           </a:p>
@@ -3558,6 +3691,7 @@
           <a:p>
             <a:fld id="{8868DC54-BAD1-41E2-8A34-E4BFC1AB4FEC}" type="slidenum">
               <a:rPr lang="zh-CN" altLang="en-US" smtClean="0"/>
+              <a:t>‹#›</a:t>
             </a:fld>
             <a:endParaRPr lang="zh-CN" altLang="en-US"/>
           </a:p>
@@ -3607,7 +3741,6 @@
               <a:rPr lang="zh-CN" altLang="en-US"/>
               <a:t>单击此处编辑母版标题样式</a:t>
             </a:r>
-            <a:endParaRPr lang="zh-CN" altLang="en-US"/>
           </a:p>
         </p:txBody>
       </p:sp>
@@ -3631,7 +3764,6 @@
               <a:rPr lang="zh-CN" altLang="en-US"/>
               <a:t>单击此处编辑母版文本样式</a:t>
             </a:r>
-            <a:endParaRPr lang="zh-CN" altLang="en-US"/>
           </a:p>
           <a:p>
             <a:pPr lvl="1"/>
@@ -3639,7 +3771,6 @@
               <a:rPr lang="zh-CN" altLang="en-US"/>
               <a:t>二级</a:t>
             </a:r>
-            <a:endParaRPr lang="zh-CN" altLang="en-US"/>
           </a:p>
           <a:p>
             <a:pPr lvl="2"/>
@@ -3647,7 +3778,6 @@
               <a:rPr lang="zh-CN" altLang="en-US"/>
               <a:t>三级</a:t>
             </a:r>
-            <a:endParaRPr lang="zh-CN" altLang="en-US"/>
           </a:p>
           <a:p>
             <a:pPr lvl="3"/>
@@ -3655,7 +3785,6 @@
               <a:rPr lang="zh-CN" altLang="en-US"/>
               <a:t>四级</a:t>
             </a:r>
-            <a:endParaRPr lang="zh-CN" altLang="en-US"/>
           </a:p>
           <a:p>
             <a:pPr lvl="4"/>
@@ -3663,7 +3792,6 @@
               <a:rPr lang="zh-CN" altLang="en-US"/>
               <a:t>五级</a:t>
             </a:r>
-            <a:endParaRPr lang="zh-CN" altLang="en-US"/>
           </a:p>
         </p:txBody>
       </p:sp>
@@ -3684,6 +3812,7 @@
           <a:p>
             <a:fld id="{E45C1C0B-BEED-40A4-BB03-2B5E358FDD63}" type="datetimeFigureOut">
               <a:rPr lang="zh-CN" altLang="en-US" smtClean="0"/>
+              <a:t>2025/5/25</a:t>
             </a:fld>
             <a:endParaRPr lang="zh-CN" altLang="en-US"/>
           </a:p>
@@ -3725,6 +3854,7 @@
           <a:p>
             <a:fld id="{8868DC54-BAD1-41E2-8A34-E4BFC1AB4FEC}" type="slidenum">
               <a:rPr lang="zh-CN" altLang="en-US" smtClean="0"/>
+              <a:t>‹#›</a:t>
             </a:fld>
             <a:endParaRPr lang="zh-CN" altLang="en-US"/>
           </a:p>
@@ -3779,7 +3909,6 @@
               <a:rPr lang="zh-CN" altLang="en-US"/>
               <a:t>单击此处编辑母版标题样式</a:t>
             </a:r>
-            <a:endParaRPr lang="zh-CN" altLang="en-US"/>
           </a:p>
         </p:txBody>
       </p:sp>
@@ -3808,7 +3937,6 @@
               <a:rPr lang="zh-CN" altLang="en-US"/>
               <a:t>单击此处编辑母版文本样式</a:t>
             </a:r>
-            <a:endParaRPr lang="zh-CN" altLang="en-US"/>
           </a:p>
           <a:p>
             <a:pPr lvl="1"/>
@@ -3816,7 +3944,6 @@
               <a:rPr lang="zh-CN" altLang="en-US"/>
               <a:t>二级</a:t>
             </a:r>
-            <a:endParaRPr lang="zh-CN" altLang="en-US"/>
           </a:p>
           <a:p>
             <a:pPr lvl="2"/>
@@ -3824,7 +3951,6 @@
               <a:rPr lang="zh-CN" altLang="en-US"/>
               <a:t>三级</a:t>
             </a:r>
-            <a:endParaRPr lang="zh-CN" altLang="en-US"/>
           </a:p>
           <a:p>
             <a:pPr lvl="3"/>
@@ -3832,7 +3958,6 @@
               <a:rPr lang="zh-CN" altLang="en-US"/>
               <a:t>四级</a:t>
             </a:r>
-            <a:endParaRPr lang="zh-CN" altLang="en-US"/>
           </a:p>
           <a:p>
             <a:pPr lvl="4"/>
@@ -3840,7 +3965,6 @@
               <a:rPr lang="zh-CN" altLang="en-US"/>
               <a:t>五级</a:t>
             </a:r>
-            <a:endParaRPr lang="zh-CN" altLang="en-US"/>
           </a:p>
         </p:txBody>
       </p:sp>
@@ -3861,6 +3985,7 @@
           <a:p>
             <a:fld id="{E45C1C0B-BEED-40A4-BB03-2B5E358FDD63}" type="datetimeFigureOut">
               <a:rPr lang="zh-CN" altLang="en-US" smtClean="0"/>
+              <a:t>2025/5/25</a:t>
             </a:fld>
             <a:endParaRPr lang="zh-CN" altLang="en-US"/>
           </a:p>
@@ -3902,6 +4027,7 @@
           <a:p>
             <a:fld id="{8868DC54-BAD1-41E2-8A34-E4BFC1AB4FEC}" type="slidenum">
               <a:rPr lang="zh-CN" altLang="en-US" smtClean="0"/>
+              <a:t>‹#›</a:t>
             </a:fld>
             <a:endParaRPr lang="zh-CN" altLang="en-US"/>
           </a:p>
@@ -3960,7 +4086,6 @@
               <a:rPr lang="zh-CN" altLang="en-US"/>
               <a:t>单击此处编辑母版标题样式</a:t>
             </a:r>
-            <a:endParaRPr lang="zh-CN" altLang="en-US"/>
           </a:p>
         </p:txBody>
       </p:sp>
@@ -4080,7 +4205,6 @@
               <a:rPr lang="zh-CN" altLang="en-US"/>
               <a:t>单击此处编辑母版文本样式</a:t>
             </a:r>
-            <a:endParaRPr lang="zh-CN" altLang="en-US"/>
           </a:p>
         </p:txBody>
       </p:sp>
@@ -4101,6 +4225,7 @@
           <a:p>
             <a:fld id="{E45C1C0B-BEED-40A4-BB03-2B5E358FDD63}" type="datetimeFigureOut">
               <a:rPr lang="zh-CN" altLang="en-US" smtClean="0"/>
+              <a:t>2025/5/25</a:t>
             </a:fld>
             <a:endParaRPr lang="zh-CN" altLang="en-US"/>
           </a:p>
@@ -4142,6 +4267,7 @@
           <a:p>
             <a:fld id="{8868DC54-BAD1-41E2-8A34-E4BFC1AB4FEC}" type="slidenum">
               <a:rPr lang="zh-CN" altLang="en-US" smtClean="0"/>
+              <a:t>‹#›</a:t>
             </a:fld>
             <a:endParaRPr lang="zh-CN" altLang="en-US"/>
           </a:p>
@@ -4191,7 +4317,6 @@
               <a:rPr lang="zh-CN" altLang="en-US"/>
               <a:t>单击此处编辑母版标题样式</a:t>
             </a:r>
-            <a:endParaRPr lang="zh-CN" altLang="en-US"/>
           </a:p>
         </p:txBody>
       </p:sp>
@@ -4220,7 +4345,6 @@
               <a:rPr lang="zh-CN" altLang="en-US"/>
               <a:t>单击此处编辑母版文本样式</a:t>
             </a:r>
-            <a:endParaRPr lang="zh-CN" altLang="en-US"/>
           </a:p>
           <a:p>
             <a:pPr lvl="1"/>
@@ -4228,7 +4352,6 @@
               <a:rPr lang="zh-CN" altLang="en-US"/>
               <a:t>二级</a:t>
             </a:r>
-            <a:endParaRPr lang="zh-CN" altLang="en-US"/>
           </a:p>
           <a:p>
             <a:pPr lvl="2"/>
@@ -4236,7 +4359,6 @@
               <a:rPr lang="zh-CN" altLang="en-US"/>
               <a:t>三级</a:t>
             </a:r>
-            <a:endParaRPr lang="zh-CN" altLang="en-US"/>
           </a:p>
           <a:p>
             <a:pPr lvl="3"/>
@@ -4244,7 +4366,6 @@
               <a:rPr lang="zh-CN" altLang="en-US"/>
               <a:t>四级</a:t>
             </a:r>
-            <a:endParaRPr lang="zh-CN" altLang="en-US"/>
           </a:p>
           <a:p>
             <a:pPr lvl="4"/>
@@ -4252,7 +4373,6 @@
               <a:rPr lang="zh-CN" altLang="en-US"/>
               <a:t>五级</a:t>
             </a:r>
-            <a:endParaRPr lang="zh-CN" altLang="en-US"/>
           </a:p>
         </p:txBody>
       </p:sp>
@@ -4281,7 +4401,6 @@
               <a:rPr lang="zh-CN" altLang="en-US"/>
               <a:t>单击此处编辑母版文本样式</a:t>
             </a:r>
-            <a:endParaRPr lang="zh-CN" altLang="en-US"/>
           </a:p>
           <a:p>
             <a:pPr lvl="1"/>
@@ -4289,7 +4408,6 @@
               <a:rPr lang="zh-CN" altLang="en-US"/>
               <a:t>二级</a:t>
             </a:r>
-            <a:endParaRPr lang="zh-CN" altLang="en-US"/>
           </a:p>
           <a:p>
             <a:pPr lvl="2"/>
@@ -4297,7 +4415,6 @@
               <a:rPr lang="zh-CN" altLang="en-US"/>
               <a:t>三级</a:t>
             </a:r>
-            <a:endParaRPr lang="zh-CN" altLang="en-US"/>
           </a:p>
           <a:p>
             <a:pPr lvl="3"/>
@@ -4305,7 +4422,6 @@
               <a:rPr lang="zh-CN" altLang="en-US"/>
               <a:t>四级</a:t>
             </a:r>
-            <a:endParaRPr lang="zh-CN" altLang="en-US"/>
           </a:p>
           <a:p>
             <a:pPr lvl="4"/>
@@ -4313,7 +4429,6 @@
               <a:rPr lang="zh-CN" altLang="en-US"/>
               <a:t>五级</a:t>
             </a:r>
-            <a:endParaRPr lang="zh-CN" altLang="en-US"/>
           </a:p>
         </p:txBody>
       </p:sp>
@@ -4334,6 +4449,7 @@
           <a:p>
             <a:fld id="{E45C1C0B-BEED-40A4-BB03-2B5E358FDD63}" type="datetimeFigureOut">
               <a:rPr lang="zh-CN" altLang="en-US" smtClean="0"/>
+              <a:t>2025/5/25</a:t>
             </a:fld>
             <a:endParaRPr lang="zh-CN" altLang="en-US"/>
           </a:p>
@@ -4375,6 +4491,7 @@
           <a:p>
             <a:fld id="{8868DC54-BAD1-41E2-8A34-E4BFC1AB4FEC}" type="slidenum">
               <a:rPr lang="zh-CN" altLang="en-US" smtClean="0"/>
+              <a:t>‹#›</a:t>
             </a:fld>
             <a:endParaRPr lang="zh-CN" altLang="en-US"/>
           </a:p>
@@ -4429,7 +4546,6 @@
               <a:rPr lang="zh-CN" altLang="en-US"/>
               <a:t>单击此处编辑母版标题样式</a:t>
             </a:r>
-            <a:endParaRPr lang="zh-CN" altLang="en-US"/>
           </a:p>
         </p:txBody>
       </p:sp>
@@ -4495,7 +4611,6 @@
               <a:rPr lang="zh-CN" altLang="en-US"/>
               <a:t>单击此处编辑母版文本样式</a:t>
             </a:r>
-            <a:endParaRPr lang="zh-CN" altLang="en-US"/>
           </a:p>
         </p:txBody>
       </p:sp>
@@ -4524,7 +4639,6 @@
               <a:rPr lang="zh-CN" altLang="en-US"/>
               <a:t>单击此处编辑母版文本样式</a:t>
             </a:r>
-            <a:endParaRPr lang="zh-CN" altLang="en-US"/>
           </a:p>
           <a:p>
             <a:pPr lvl="1"/>
@@ -4532,7 +4646,6 @@
               <a:rPr lang="zh-CN" altLang="en-US"/>
               <a:t>二级</a:t>
             </a:r>
-            <a:endParaRPr lang="zh-CN" altLang="en-US"/>
           </a:p>
           <a:p>
             <a:pPr lvl="2"/>
@@ -4540,7 +4653,6 @@
               <a:rPr lang="zh-CN" altLang="en-US"/>
               <a:t>三级</a:t>
             </a:r>
-            <a:endParaRPr lang="zh-CN" altLang="en-US"/>
           </a:p>
           <a:p>
             <a:pPr lvl="3"/>
@@ -4548,7 +4660,6 @@
               <a:rPr lang="zh-CN" altLang="en-US"/>
               <a:t>四级</a:t>
             </a:r>
-            <a:endParaRPr lang="zh-CN" altLang="en-US"/>
           </a:p>
           <a:p>
             <a:pPr lvl="4"/>
@@ -4556,7 +4667,6 @@
               <a:rPr lang="zh-CN" altLang="en-US"/>
               <a:t>五级</a:t>
             </a:r>
-            <a:endParaRPr lang="zh-CN" altLang="en-US"/>
           </a:p>
         </p:txBody>
       </p:sp>
@@ -4622,7 +4732,6 @@
               <a:rPr lang="zh-CN" altLang="en-US"/>
               <a:t>单击此处编辑母版文本样式</a:t>
             </a:r>
-            <a:endParaRPr lang="zh-CN" altLang="en-US"/>
           </a:p>
         </p:txBody>
       </p:sp>
@@ -4651,7 +4760,6 @@
               <a:rPr lang="zh-CN" altLang="en-US"/>
               <a:t>单击此处编辑母版文本样式</a:t>
             </a:r>
-            <a:endParaRPr lang="zh-CN" altLang="en-US"/>
           </a:p>
           <a:p>
             <a:pPr lvl="1"/>
@@ -4659,7 +4767,6 @@
               <a:rPr lang="zh-CN" altLang="en-US"/>
               <a:t>二级</a:t>
             </a:r>
-            <a:endParaRPr lang="zh-CN" altLang="en-US"/>
           </a:p>
           <a:p>
             <a:pPr lvl="2"/>
@@ -4667,7 +4774,6 @@
               <a:rPr lang="zh-CN" altLang="en-US"/>
               <a:t>三级</a:t>
             </a:r>
-            <a:endParaRPr lang="zh-CN" altLang="en-US"/>
           </a:p>
           <a:p>
             <a:pPr lvl="3"/>
@@ -4675,7 +4781,6 @@
               <a:rPr lang="zh-CN" altLang="en-US"/>
               <a:t>四级</a:t>
             </a:r>
-            <a:endParaRPr lang="zh-CN" altLang="en-US"/>
           </a:p>
           <a:p>
             <a:pPr lvl="4"/>
@@ -4683,7 +4788,6 @@
               <a:rPr lang="zh-CN" altLang="en-US"/>
               <a:t>五级</a:t>
             </a:r>
-            <a:endParaRPr lang="zh-CN" altLang="en-US"/>
           </a:p>
         </p:txBody>
       </p:sp>
@@ -4704,6 +4808,7 @@
           <a:p>
             <a:fld id="{E45C1C0B-BEED-40A4-BB03-2B5E358FDD63}" type="datetimeFigureOut">
               <a:rPr lang="zh-CN" altLang="en-US" smtClean="0"/>
+              <a:t>2025/5/25</a:t>
             </a:fld>
             <a:endParaRPr lang="zh-CN" altLang="en-US"/>
           </a:p>
@@ -4745,6 +4850,7 @@
           <a:p>
             <a:fld id="{8868DC54-BAD1-41E2-8A34-E4BFC1AB4FEC}" type="slidenum">
               <a:rPr lang="zh-CN" altLang="en-US" smtClean="0"/>
+              <a:t>‹#›</a:t>
             </a:fld>
             <a:endParaRPr lang="zh-CN" altLang="en-US"/>
           </a:p>
@@ -4794,7 +4900,6 @@
               <a:rPr lang="zh-CN" altLang="en-US"/>
               <a:t>单击此处编辑母版标题样式</a:t>
             </a:r>
-            <a:endParaRPr lang="zh-CN" altLang="en-US"/>
           </a:p>
         </p:txBody>
       </p:sp>
@@ -4815,6 +4920,7 @@
           <a:p>
             <a:fld id="{E45C1C0B-BEED-40A4-BB03-2B5E358FDD63}" type="datetimeFigureOut">
               <a:rPr lang="zh-CN" altLang="en-US" smtClean="0"/>
+              <a:t>2025/5/25</a:t>
             </a:fld>
             <a:endParaRPr lang="zh-CN" altLang="en-US"/>
           </a:p>
@@ -4856,6 +4962,7 @@
           <a:p>
             <a:fld id="{8868DC54-BAD1-41E2-8A34-E4BFC1AB4FEC}" type="slidenum">
               <a:rPr lang="zh-CN" altLang="en-US" smtClean="0"/>
+              <a:t>‹#›</a:t>
             </a:fld>
             <a:endParaRPr lang="zh-CN" altLang="en-US"/>
           </a:p>
@@ -4903,6 +5010,7 @@
           <a:p>
             <a:fld id="{E45C1C0B-BEED-40A4-BB03-2B5E358FDD63}" type="datetimeFigureOut">
               <a:rPr lang="zh-CN" altLang="en-US" smtClean="0"/>
+              <a:t>2025/5/25</a:t>
             </a:fld>
             <a:endParaRPr lang="zh-CN" altLang="en-US"/>
           </a:p>
@@ -4944,6 +5052,7 @@
           <a:p>
             <a:fld id="{8868DC54-BAD1-41E2-8A34-E4BFC1AB4FEC}" type="slidenum">
               <a:rPr lang="zh-CN" altLang="en-US" smtClean="0"/>
+              <a:t>‹#›</a:t>
             </a:fld>
             <a:endParaRPr lang="zh-CN" altLang="en-US"/>
           </a:p>
@@ -5002,7 +5111,6 @@
               <a:rPr lang="zh-CN" altLang="en-US"/>
               <a:t>单击此处编辑母版标题样式</a:t>
             </a:r>
-            <a:endParaRPr lang="zh-CN" altLang="en-US"/>
           </a:p>
         </p:txBody>
       </p:sp>
@@ -5059,7 +5167,6 @@
               <a:rPr lang="zh-CN" altLang="en-US"/>
               <a:t>单击此处编辑母版文本样式</a:t>
             </a:r>
-            <a:endParaRPr lang="zh-CN" altLang="en-US"/>
           </a:p>
           <a:p>
             <a:pPr lvl="1"/>
@@ -5067,7 +5174,6 @@
               <a:rPr lang="zh-CN" altLang="en-US"/>
               <a:t>二级</a:t>
             </a:r>
-            <a:endParaRPr lang="zh-CN" altLang="en-US"/>
           </a:p>
           <a:p>
             <a:pPr lvl="2"/>
@@ -5075,7 +5181,6 @@
               <a:rPr lang="zh-CN" altLang="en-US"/>
               <a:t>三级</a:t>
             </a:r>
-            <a:endParaRPr lang="zh-CN" altLang="en-US"/>
           </a:p>
           <a:p>
             <a:pPr lvl="3"/>
@@ -5083,7 +5188,6 @@
               <a:rPr lang="zh-CN" altLang="en-US"/>
               <a:t>四级</a:t>
             </a:r>
-            <a:endParaRPr lang="zh-CN" altLang="en-US"/>
           </a:p>
           <a:p>
             <a:pPr lvl="4"/>
@@ -5091,7 +5195,6 @@
               <a:rPr lang="zh-CN" altLang="en-US"/>
               <a:t>五级</a:t>
             </a:r>
-            <a:endParaRPr lang="zh-CN" altLang="en-US"/>
           </a:p>
         </p:txBody>
       </p:sp>
@@ -5157,7 +5260,6 @@
               <a:rPr lang="zh-CN" altLang="en-US"/>
               <a:t>单击此处编辑母版文本样式</a:t>
             </a:r>
-            <a:endParaRPr lang="zh-CN" altLang="en-US"/>
           </a:p>
         </p:txBody>
       </p:sp>
@@ -5178,6 +5280,7 @@
           <a:p>
             <a:fld id="{E45C1C0B-BEED-40A4-BB03-2B5E358FDD63}" type="datetimeFigureOut">
               <a:rPr lang="zh-CN" altLang="en-US" smtClean="0"/>
+              <a:t>2025/5/25</a:t>
             </a:fld>
             <a:endParaRPr lang="zh-CN" altLang="en-US"/>
           </a:p>
@@ -5219,6 +5322,7 @@
           <a:p>
             <a:fld id="{8868DC54-BAD1-41E2-8A34-E4BFC1AB4FEC}" type="slidenum">
               <a:rPr lang="zh-CN" altLang="en-US" smtClean="0"/>
+              <a:t>‹#›</a:t>
             </a:fld>
             <a:endParaRPr lang="zh-CN" altLang="en-US"/>
           </a:p>
@@ -5277,7 +5381,6 @@
               <a:rPr lang="zh-CN" altLang="en-US"/>
               <a:t>单击此处编辑母版标题样式</a:t>
             </a:r>
-            <a:endParaRPr lang="zh-CN" altLang="en-US"/>
           </a:p>
         </p:txBody>
       </p:sp>
@@ -5404,7 +5507,6 @@
               <a:rPr lang="zh-CN" altLang="en-US"/>
               <a:t>单击此处编辑母版文本样式</a:t>
             </a:r>
-            <a:endParaRPr lang="zh-CN" altLang="en-US"/>
           </a:p>
         </p:txBody>
       </p:sp>
@@ -5425,6 +5527,7 @@
           <a:p>
             <a:fld id="{E45C1C0B-BEED-40A4-BB03-2B5E358FDD63}" type="datetimeFigureOut">
               <a:rPr lang="zh-CN" altLang="en-US" smtClean="0"/>
+              <a:t>2025/5/25</a:t>
             </a:fld>
             <a:endParaRPr lang="zh-CN" altLang="en-US"/>
           </a:p>
@@ -5466,6 +5569,7 @@
           <a:p>
             <a:fld id="{8868DC54-BAD1-41E2-8A34-E4BFC1AB4FEC}" type="slidenum">
               <a:rPr lang="zh-CN" altLang="en-US" smtClean="0"/>
+              <a:t>‹#›</a:t>
             </a:fld>
             <a:endParaRPr lang="zh-CN" altLang="en-US"/>
           </a:p>
@@ -5530,7 +5634,6 @@
               <a:rPr lang="zh-CN" altLang="en-US"/>
               <a:t>单击此处编辑母版标题样式</a:t>
             </a:r>
-            <a:endParaRPr lang="zh-CN" altLang="en-US"/>
           </a:p>
         </p:txBody>
       </p:sp>
@@ -5564,7 +5667,6 @@
               <a:rPr lang="zh-CN" altLang="en-US"/>
               <a:t>单击此处编辑母版文本样式</a:t>
             </a:r>
-            <a:endParaRPr lang="zh-CN" altLang="en-US"/>
           </a:p>
           <a:p>
             <a:pPr lvl="1"/>
@@ -5572,7 +5674,6 @@
               <a:rPr lang="zh-CN" altLang="en-US"/>
               <a:t>二级</a:t>
             </a:r>
-            <a:endParaRPr lang="zh-CN" altLang="en-US"/>
           </a:p>
           <a:p>
             <a:pPr lvl="2"/>
@@ -5580,7 +5681,6 @@
               <a:rPr lang="zh-CN" altLang="en-US"/>
               <a:t>三级</a:t>
             </a:r>
-            <a:endParaRPr lang="zh-CN" altLang="en-US"/>
           </a:p>
           <a:p>
             <a:pPr lvl="3"/>
@@ -5588,7 +5688,6 @@
               <a:rPr lang="zh-CN" altLang="en-US"/>
               <a:t>四级</a:t>
             </a:r>
-            <a:endParaRPr lang="zh-CN" altLang="en-US"/>
           </a:p>
           <a:p>
             <a:pPr lvl="4"/>
@@ -5596,7 +5695,6 @@
               <a:rPr lang="zh-CN" altLang="en-US"/>
               <a:t>五级</a:t>
             </a:r>
-            <a:endParaRPr lang="zh-CN" altLang="en-US"/>
           </a:p>
         </p:txBody>
       </p:sp>
@@ -5635,6 +5733,7 @@
           <a:p>
             <a:fld id="{E45C1C0B-BEED-40A4-BB03-2B5E358FDD63}" type="datetimeFigureOut">
               <a:rPr lang="zh-CN" altLang="en-US" smtClean="0"/>
+              <a:t>2025/5/25</a:t>
             </a:fld>
             <a:endParaRPr lang="zh-CN" altLang="en-US"/>
           </a:p>
@@ -5712,6 +5811,7 @@
           <a:p>
             <a:fld id="{8868DC54-BAD1-41E2-8A34-E4BFC1AB4FEC}" type="slidenum">
               <a:rPr lang="zh-CN" altLang="en-US" smtClean="0"/>
+              <a:t>‹#›</a:t>
             </a:fld>
             <a:endParaRPr lang="zh-CN" altLang="en-US"/>
           </a:p>
@@ -6067,7 +6167,6 @@
               <a:rPr lang="zh-CN" altLang="en-US"/>
               <a:t>单击此处编辑母版标题样式</a:t>
             </a:r>
-            <a:endParaRPr lang="zh-CN" altLang="en-US"/>
           </a:p>
         </p:txBody>
       </p:sp>
@@ -6101,7 +6200,6 @@
               <a:rPr lang="zh-CN" altLang="en-US"/>
               <a:t>单击此处编辑母版文本样式</a:t>
             </a:r>
-            <a:endParaRPr lang="zh-CN" altLang="en-US"/>
           </a:p>
           <a:p>
             <a:pPr lvl="1"/>
@@ -6109,7 +6207,6 @@
               <a:rPr lang="zh-CN" altLang="en-US"/>
               <a:t>二级</a:t>
             </a:r>
-            <a:endParaRPr lang="zh-CN" altLang="en-US"/>
           </a:p>
           <a:p>
             <a:pPr lvl="2"/>
@@ -6117,7 +6214,6 @@
               <a:rPr lang="zh-CN" altLang="en-US"/>
               <a:t>三级</a:t>
             </a:r>
-            <a:endParaRPr lang="zh-CN" altLang="en-US"/>
           </a:p>
           <a:p>
             <a:pPr lvl="3"/>
@@ -6125,7 +6221,6 @@
               <a:rPr lang="zh-CN" altLang="en-US"/>
               <a:t>四级</a:t>
             </a:r>
-            <a:endParaRPr lang="zh-CN" altLang="en-US"/>
           </a:p>
           <a:p>
             <a:pPr lvl="4"/>
@@ -6133,7 +6228,6 @@
               <a:rPr lang="zh-CN" altLang="en-US"/>
               <a:t>五级</a:t>
             </a:r>
-            <a:endParaRPr lang="zh-CN" altLang="en-US"/>
           </a:p>
         </p:txBody>
       </p:sp>
@@ -6172,6 +6266,7 @@
           <a:p>
             <a:fld id="{E45C1C0B-BEED-40A4-BB03-2B5E358FDD63}" type="datetimeFigureOut">
               <a:rPr lang="zh-CN" altLang="en-US" smtClean="0"/>
+              <a:t>2025/5/25</a:t>
             </a:fld>
             <a:endParaRPr lang="zh-CN" altLang="en-US"/>
           </a:p>
@@ -6249,6 +6344,7 @@
           <a:p>
             <a:fld id="{8868DC54-BAD1-41E2-8A34-E4BFC1AB4FEC}" type="slidenum">
               <a:rPr lang="zh-CN" altLang="en-US" smtClean="0"/>
+              <a:t>‹#›</a:t>
             </a:fld>
             <a:endParaRPr lang="zh-CN" altLang="en-US"/>
           </a:p>
@@ -6636,20 +6732,6 @@
               </a:rPr>
               <a:t>感谢您拨冗参加实验</a:t>
             </a:r>
-            <a:endParaRPr kumimoji="0" lang="zh-CN" altLang="en-US" sz="5400" b="0" i="0" u="none" strike="noStrike" kern="1200" cap="none" spc="0" normalizeH="0" baseline="0" noProof="0" dirty="0">
-              <a:ln>
-                <a:noFill/>
-              </a:ln>
-              <a:solidFill>
-                <a:prstClr val="black"/>
-              </a:solidFill>
-              <a:effectLst/>
-              <a:uLnTx/>
-              <a:uFillTx/>
-              <a:latin typeface="楷体" panose="02010609060101010101" pitchFamily="49" charset="-122"/>
-              <a:ea typeface="楷体" panose="02010609060101010101" pitchFamily="49" charset="-122"/>
-              <a:cs typeface="+mn-cs"/>
-            </a:endParaRPr>
           </a:p>
         </p:txBody>
       </p:sp>
@@ -7422,20 +7504,6 @@
               </a:rPr>
               <a:t>练习阶段</a:t>
             </a:r>
-            <a:endParaRPr kumimoji="0" lang="zh-CN" altLang="en-US" sz="5400" b="0" i="0" u="none" strike="noStrike" kern="1200" cap="none" spc="0" normalizeH="0" baseline="0" noProof="0" dirty="0">
-              <a:ln>
-                <a:noFill/>
-              </a:ln>
-              <a:solidFill>
-                <a:prstClr val="black"/>
-              </a:solidFill>
-              <a:effectLst/>
-              <a:uLnTx/>
-              <a:uFillTx/>
-              <a:latin typeface="楷体" panose="02010609060101010101" pitchFamily="49" charset="-122"/>
-              <a:ea typeface="楷体" panose="02010609060101010101" pitchFamily="49" charset="-122"/>
-              <a:cs typeface="+mn-cs"/>
-            </a:endParaRPr>
           </a:p>
         </p:txBody>
       </p:sp>
@@ -7448,7 +7516,7 @@
         <p:spPr>
           <a:xfrm>
             <a:off x="1500050" y="1645919"/>
-            <a:ext cx="9714412" cy="4603183"/>
+            <a:ext cx="9714412" cy="4707890"/>
           </a:xfrm>
           <a:prstGeom prst="rect">
             <a:avLst/>
@@ -7542,6 +7610,16 @@
               <a:defRPr/>
             </a:pPr>
             <a:r>
+              <a:rPr lang="zh-CN" altLang="en-US" sz="4000" b="1" u="sng" dirty="0">
+                <a:solidFill>
+                  <a:prstClr val="black"/>
+                </a:solidFill>
+                <a:latin typeface="黑体" panose="02010609060101010101" pitchFamily="49" charset="-122"/>
+                <a:ea typeface="黑体" panose="02010609060101010101" pitchFamily="49" charset="-122"/>
+              </a:rPr>
+              <a:t>10秒内</a:t>
+            </a:r>
+            <a:r>
               <a:rPr kumimoji="0" lang="zh-CN" altLang="en-US" sz="4000" b="0" i="0" u="none" strike="noStrike" kern="1200" cap="none" spc="0" normalizeH="0" baseline="0" noProof="0" dirty="0">
                 <a:ln>
                   <a:noFill/>
@@ -7556,7 +7634,7 @@
                 <a:ea typeface="楷体" panose="02010609060101010101" pitchFamily="49" charset="-122"/>
                 <a:cs typeface="+mn-cs"/>
               </a:rPr>
-              <a:t>尽快找到藏在黑白花纹中的小光栅</a:t>
+              <a:t>找到藏在黑白花纹中的小光栅</a:t>
             </a:r>
             <a:endParaRPr kumimoji="0" lang="en-US" altLang="zh-CN" sz="4000" b="0" i="0" u="none" strike="noStrike" kern="1200" cap="none" spc="0" normalizeH="0" baseline="0" noProof="0" dirty="0">
               <a:ln>
@@ -7920,20 +7998,6 @@
               </a:rPr>
               <a:t>即可通过</a:t>
             </a:r>
-            <a:endParaRPr kumimoji="0" lang="zh-CN" altLang="en-US" sz="4000" b="0" i="0" u="none" strike="noStrike" kern="1200" cap="none" spc="0" normalizeH="0" baseline="0" noProof="0" dirty="0">
-              <a:ln>
-                <a:noFill/>
-              </a:ln>
-              <a:solidFill>
-                <a:prstClr val="black"/>
-              </a:solidFill>
-              <a:effectLst/>
-              <a:uLnTx/>
-              <a:uFillTx/>
-              <a:latin typeface="楷体" panose="02010609060101010101" pitchFamily="49" charset="-122"/>
-              <a:ea typeface="楷体" panose="02010609060101010101" pitchFamily="49" charset="-122"/>
-              <a:cs typeface="+mn-cs"/>
-            </a:endParaRPr>
           </a:p>
         </p:txBody>
       </p:sp>
@@ -8171,7 +8235,7 @@
           <p:nvPr/>
         </p:nvPicPr>
         <p:blipFill>
-          <a:blip r:embed="rId1" cstate="hqprint"/>
+          <a:blip r:embed="rId2" cstate="hqprint"/>
           <a:srcRect/>
           <a:stretch>
             <a:fillRect/>
@@ -8278,20 +8342,6 @@
               </a:rPr>
               <a:t>校准检查</a:t>
             </a:r>
-            <a:endParaRPr kumimoji="0" lang="zh-CN" altLang="en-US" sz="5400" b="0" i="0" u="none" strike="noStrike" kern="1200" cap="none" spc="0" normalizeH="0" baseline="0" noProof="0" dirty="0">
-              <a:ln>
-                <a:noFill/>
-              </a:ln>
-              <a:solidFill>
-                <a:prstClr val="black"/>
-              </a:solidFill>
-              <a:effectLst/>
-              <a:uLnTx/>
-              <a:uFillTx/>
-              <a:latin typeface="楷体" panose="02010609060101010101" pitchFamily="49" charset="-122"/>
-              <a:ea typeface="楷体" panose="02010609060101010101" pitchFamily="49" charset="-122"/>
-              <a:cs typeface="+mn-cs"/>
-            </a:endParaRPr>
           </a:p>
         </p:txBody>
       </p:sp>
@@ -8959,20 +9009,6 @@
               </a:rPr>
               <a:t>正式实验</a:t>
             </a:r>
-            <a:endParaRPr kumimoji="0" lang="zh-CN" altLang="en-US" sz="5400" b="0" i="0" u="none" strike="noStrike" kern="1200" cap="none" spc="0" normalizeH="0" baseline="0" noProof="0" dirty="0">
-              <a:ln>
-                <a:noFill/>
-              </a:ln>
-              <a:solidFill>
-                <a:prstClr val="black"/>
-              </a:solidFill>
-              <a:effectLst/>
-              <a:uLnTx/>
-              <a:uFillTx/>
-              <a:latin typeface="楷体" panose="02010609060101010101" pitchFamily="49" charset="-122"/>
-              <a:ea typeface="楷体" panose="02010609060101010101" pitchFamily="49" charset="-122"/>
-              <a:cs typeface="+mn-cs"/>
-            </a:endParaRPr>
           </a:p>
         </p:txBody>
       </p:sp>
@@ -9081,6 +9117,16 @@
               <a:defRPr/>
             </a:pPr>
             <a:r>
+              <a:rPr lang="zh-CN" altLang="en-US" sz="4000" b="1" u="sng" dirty="0">
+                <a:solidFill>
+                  <a:prstClr val="black"/>
+                </a:solidFill>
+                <a:latin typeface="黑体" panose="02010609060101010101" pitchFamily="49" charset="-122"/>
+                <a:ea typeface="黑体" panose="02010609060101010101" pitchFamily="49" charset="-122"/>
+              </a:rPr>
+              <a:t>10秒内</a:t>
+            </a:r>
+            <a:r>
               <a:rPr kumimoji="0" lang="zh-CN" altLang="en-US" sz="4000" b="0" i="0" u="none" strike="noStrike" kern="1200" cap="none" spc="0" normalizeH="0" baseline="0" noProof="0" dirty="0">
                 <a:ln>
                   <a:noFill/>
@@ -9095,7 +9141,7 @@
                 <a:ea typeface="楷体" panose="02010609060101010101" pitchFamily="49" charset="-122"/>
                 <a:cs typeface="+mn-cs"/>
               </a:rPr>
-              <a:t>尽快找到藏在黑白花纹中的小光栅</a:t>
+              <a:t>找到藏在黑白花纹中的小光栅</a:t>
             </a:r>
             <a:endParaRPr kumimoji="0" lang="en-US" altLang="zh-CN" sz="4000" b="0" i="0" u="none" strike="noStrike" kern="1200" cap="none" spc="0" normalizeH="0" baseline="0" noProof="0" dirty="0">
               <a:ln>
@@ -9541,20 +9587,6 @@
               </a:rPr>
               <a:t>秒</a:t>
             </a:r>
-            <a:endParaRPr kumimoji="0" lang="zh-CN" altLang="en-US" sz="4000" b="0" i="0" u="none" strike="noStrike" kern="1200" cap="none" spc="0" normalizeH="0" baseline="0" noProof="0" dirty="0">
-              <a:ln>
-                <a:noFill/>
-              </a:ln>
-              <a:solidFill>
-                <a:prstClr val="black"/>
-              </a:solidFill>
-              <a:effectLst/>
-              <a:uLnTx/>
-              <a:uFillTx/>
-              <a:latin typeface="楷体" panose="02010609060101010101" pitchFamily="49" charset="-122"/>
-              <a:ea typeface="楷体" panose="02010609060101010101" pitchFamily="49" charset="-122"/>
-              <a:cs typeface="+mn-cs"/>
-            </a:endParaRPr>
           </a:p>
         </p:txBody>
       </p:sp>
@@ -9821,7 +9853,7 @@
           <p:nvPr/>
         </p:nvPicPr>
         <p:blipFill>
-          <a:blip r:embed="rId1" cstate="hqprint"/>
+          <a:blip r:embed="rId2" cstate="hqprint"/>
           <a:srcRect/>
           <a:stretch>
             <a:fillRect/>
@@ -9962,20 +9994,6 @@
               </a:rPr>
               <a:t>正式实验</a:t>
             </a:r>
-            <a:endParaRPr kumimoji="0" lang="zh-CN" altLang="en-US" sz="5400" b="0" i="0" u="none" strike="noStrike" kern="1200" cap="none" spc="0" normalizeH="0" baseline="0" noProof="0" dirty="0">
-              <a:ln>
-                <a:noFill/>
-              </a:ln>
-              <a:solidFill>
-                <a:prstClr val="black"/>
-              </a:solidFill>
-              <a:effectLst/>
-              <a:uLnTx/>
-              <a:uFillTx/>
-              <a:latin typeface="楷体" panose="02010609060101010101" pitchFamily="49" charset="-122"/>
-              <a:ea typeface="楷体" panose="02010609060101010101" pitchFamily="49" charset="-122"/>
-              <a:cs typeface="+mn-cs"/>
-            </a:endParaRPr>
           </a:p>
         </p:txBody>
       </p:sp>
@@ -10084,6 +10102,16 @@
               <a:defRPr/>
             </a:pPr>
             <a:r>
+              <a:rPr lang="zh-CN" altLang="en-US" sz="4000" b="1" u="sng" dirty="0">
+                <a:solidFill>
+                  <a:prstClr val="black"/>
+                </a:solidFill>
+                <a:latin typeface="黑体" panose="02010609060101010101" pitchFamily="49" charset="-122"/>
+                <a:ea typeface="黑体" panose="02010609060101010101" pitchFamily="49" charset="-122"/>
+              </a:rPr>
+              <a:t>10秒内</a:t>
+            </a:r>
+            <a:r>
               <a:rPr kumimoji="0" lang="zh-CN" altLang="en-US" sz="4000" b="0" i="0" u="none" strike="noStrike" kern="1200" cap="none" spc="0" normalizeH="0" baseline="0" noProof="0" dirty="0">
                 <a:ln>
                   <a:noFill/>
@@ -10098,7 +10126,7 @@
                 <a:ea typeface="楷体" panose="02010609060101010101" pitchFamily="49" charset="-122"/>
                 <a:cs typeface="+mn-cs"/>
               </a:rPr>
-              <a:t>尽快找到藏在黑白花纹中的小光栅</a:t>
+              <a:t>找到藏在黑白花纹中的小光栅</a:t>
             </a:r>
             <a:endParaRPr kumimoji="0" lang="en-US" altLang="zh-CN" sz="4000" b="0" i="0" u="none" strike="noStrike" kern="1200" cap="none" spc="0" normalizeH="0" baseline="0" noProof="0" dirty="0">
               <a:ln>
@@ -10544,20 +10572,6 @@
               </a:rPr>
               <a:t>秒</a:t>
             </a:r>
-            <a:endParaRPr kumimoji="0" lang="zh-CN" altLang="en-US" sz="4000" b="0" i="0" u="none" strike="noStrike" kern="1200" cap="none" spc="0" normalizeH="0" baseline="0" noProof="0" dirty="0">
-              <a:ln>
-                <a:noFill/>
-              </a:ln>
-              <a:solidFill>
-                <a:prstClr val="black"/>
-              </a:solidFill>
-              <a:effectLst/>
-              <a:uLnTx/>
-              <a:uFillTx/>
-              <a:latin typeface="楷体" panose="02010609060101010101" pitchFamily="49" charset="-122"/>
-              <a:ea typeface="楷体" panose="02010609060101010101" pitchFamily="49" charset="-122"/>
-              <a:cs typeface="+mn-cs"/>
-            </a:endParaRPr>
           </a:p>
         </p:txBody>
       </p:sp>
@@ -10824,7 +10838,7 @@
           <p:nvPr/>
         </p:nvPicPr>
         <p:blipFill>
-          <a:blip r:embed="rId1" cstate="hqprint"/>
+          <a:blip r:embed="rId2" cstate="hqprint"/>
           <a:srcRect/>
           <a:stretch>
             <a:fillRect/>
@@ -10931,33 +10945,19 @@
               </a:rPr>
               <a:t>请稍作休息</a:t>
             </a:r>
-            <a:endParaRPr kumimoji="0" lang="zh-CN" altLang="en-US" sz="5400" b="0" i="0" u="none" strike="noStrike" kern="1200" cap="none" spc="0" normalizeH="0" baseline="0" noProof="0" dirty="0">
-              <a:ln>
-                <a:noFill/>
-              </a:ln>
-              <a:solidFill>
-                <a:prstClr val="black"/>
-              </a:solidFill>
-              <a:effectLst/>
-              <a:uLnTx/>
-              <a:uFillTx/>
-              <a:latin typeface="楷体" panose="02010609060101010101" pitchFamily="49" charset="-122"/>
-              <a:ea typeface="楷体" panose="02010609060101010101" pitchFamily="49" charset="-122"/>
-              <a:cs typeface="+mn-cs"/>
-            </a:endParaRPr>
-          </a:p>
-        </p:txBody>
-      </p:sp>
-      <p:sp>
-        <p:nvSpPr>
-          <p:cNvPr id="5" name="矩形: 圆角 4"/>
+          </a:p>
+        </p:txBody>
+      </p:sp>
+      <p:sp>
+        <p:nvSpPr>
+          <p:cNvPr id="2" name="矩形: 圆角 4"/>
           <p:cNvSpPr/>
           <p:nvPr/>
         </p:nvSpPr>
         <p:spPr>
           <a:xfrm>
-            <a:off x="8673740" y="6115676"/>
-            <a:ext cx="2481943" cy="509451"/>
+            <a:off x="9172530" y="6115676"/>
+            <a:ext cx="580842" cy="509451"/>
           </a:xfrm>
           <a:prstGeom prst="roundRect">
             <a:avLst/>
@@ -10999,7 +10999,7 @@
             <a:pPr algn="ctr"/>
             <a:r>
               <a:rPr lang="en-US" altLang="zh-CN" b="1" dirty="0"/>
-              <a:t>space</a:t>
+              <a:t>C</a:t>
             </a:r>
             <a:endParaRPr lang="zh-CN" altLang="en-US" b="1" dirty="0"/>
           </a:p>
@@ -11007,7 +11007,7 @@
       </p:sp>
       <p:sp>
         <p:nvSpPr>
-          <p:cNvPr id="6" name="文本框 5"/>
+          <p:cNvPr id="3" name="文本框 2"/>
           <p:cNvSpPr txBox="1"/>
           <p:nvPr/>
         </p:nvSpPr>
@@ -11061,6 +11061,23 @@
               <a:t>按“</a:t>
             </a:r>
             <a:r>
+              <a:rPr kumimoji="0" lang="en-US" altLang="zh-CN" sz="2800" b="1" i="0" u="sng" strike="noStrike" kern="1200" cap="none" spc="0" normalizeH="0" baseline="0" noProof="0" dirty="0">
+                <a:ln>
+                  <a:noFill/>
+                </a:ln>
+                <a:solidFill>
+                  <a:prstClr val="black"/>
+                </a:solidFill>
+                <a:effectLst/>
+                <a:uLnTx/>
+                <a:uFillTx/>
+                <a:latin typeface="楷体" panose="02010609060101010101" pitchFamily="49" charset="-122"/>
+                <a:ea typeface="楷体" panose="02010609060101010101" pitchFamily="49" charset="-122"/>
+                <a:cs typeface="+mn-cs"/>
+              </a:rPr>
+              <a:t>C</a:t>
+            </a:r>
+            <a:r>
               <a:rPr kumimoji="0" lang="zh-CN" altLang="en-US" sz="2800" b="1" i="0" u="sng" strike="noStrike" kern="1200" cap="none" spc="0" normalizeH="0" baseline="0" noProof="0" dirty="0">
                 <a:ln>
                   <a:noFill/>
@@ -11075,7 +11092,7 @@
                 <a:ea typeface="楷体" panose="02010609060101010101" pitchFamily="49" charset="-122"/>
                 <a:cs typeface="+mn-cs"/>
               </a:rPr>
-              <a:t>空格键</a:t>
+              <a:t>键</a:t>
             </a:r>
             <a:r>
               <a:rPr kumimoji="0" lang="zh-CN" altLang="en-US" sz="2800" b="0" i="0" u="none" strike="noStrike" kern="1200" cap="none" spc="0" normalizeH="0" baseline="0" noProof="0" dirty="0">
@@ -11219,20 +11236,6 @@
               </a:rPr>
               <a:t>实验结束</a:t>
             </a:r>
-            <a:endParaRPr kumimoji="0" lang="zh-CN" altLang="en-US" sz="5400" b="0" i="0" u="none" strike="noStrike" kern="1200" cap="none" spc="0" normalizeH="0" baseline="0" noProof="0" dirty="0">
-              <a:ln>
-                <a:noFill/>
-              </a:ln>
-              <a:solidFill>
-                <a:prstClr val="black"/>
-              </a:solidFill>
-              <a:effectLst/>
-              <a:uLnTx/>
-              <a:uFillTx/>
-              <a:latin typeface="楷体" panose="02010609060101010101" pitchFamily="49" charset="-122"/>
-              <a:ea typeface="楷体" panose="02010609060101010101" pitchFamily="49" charset="-122"/>
-              <a:cs typeface="+mn-cs"/>
-            </a:endParaRPr>
           </a:p>
         </p:txBody>
       </p:sp>
@@ -11606,20 +11609,6 @@
               </a:rPr>
               <a:t>眼动仪校准</a:t>
             </a:r>
-            <a:endParaRPr kumimoji="0" lang="zh-CN" altLang="en-US" sz="5400" b="0" i="0" u="none" strike="noStrike" kern="1200" cap="none" spc="0" normalizeH="0" baseline="0" noProof="0" dirty="0">
-              <a:ln>
-                <a:noFill/>
-              </a:ln>
-              <a:solidFill>
-                <a:prstClr val="black"/>
-              </a:solidFill>
-              <a:effectLst/>
-              <a:uLnTx/>
-              <a:uFillTx/>
-              <a:latin typeface="楷体" panose="02010609060101010101" pitchFamily="49" charset="-122"/>
-              <a:ea typeface="楷体" panose="02010609060101010101" pitchFamily="49" charset="-122"/>
-              <a:cs typeface="+mn-cs"/>
-            </a:endParaRPr>
           </a:p>
         </p:txBody>
       </p:sp>
@@ -11632,7 +11621,7 @@
         <p:spPr>
           <a:xfrm>
             <a:off x="1500050" y="1645919"/>
-            <a:ext cx="9714412" cy="3064300"/>
+            <a:ext cx="9714412" cy="3833742"/>
           </a:xfrm>
           <a:prstGeom prst="rect">
             <a:avLst/>
@@ -11765,7 +11754,7 @@
                 <a:latin typeface="楷体" panose="02010609060101010101" pitchFamily="49" charset="-122"/>
                 <a:ea typeface="楷体" panose="02010609060101010101" pitchFamily="49" charset="-122"/>
               </a:rPr>
-              <a:t>克制眨眼、避免移动头部</a:t>
+              <a:t>克制眨眼、避免移动头部、提前扶好眼镜</a:t>
             </a:r>
             <a:r>
               <a:rPr lang="zh-CN" altLang="en-US" sz="4000" dirty="0">
@@ -12002,7 +11991,7 @@
           <p:nvPr/>
         </p:nvPicPr>
         <p:blipFill>
-          <a:blip r:embed="rId1" cstate="hqprint"/>
+          <a:blip r:embed="rId3" cstate="hqprint"/>
           <a:srcRect/>
           <a:stretch>
             <a:fillRect/>
@@ -12071,22 +12060,8 @@
                 <a:ea typeface="楷体" panose="02010609060101010101" pitchFamily="49" charset="-122"/>
                 <a:cs typeface="+mn-cs"/>
               </a:rPr>
-              <a:t>眼动仪校准</a:t>
-            </a:r>
-            <a:endParaRPr kumimoji="0" lang="zh-CN" altLang="en-US" sz="5400" b="0" i="0" u="none" strike="noStrike" kern="1200" cap="none" spc="0" normalizeH="0" baseline="0" noProof="0" dirty="0">
-              <a:ln>
-                <a:noFill/>
-              </a:ln>
-              <a:solidFill>
-                <a:prstClr val="black"/>
-              </a:solidFill>
-              <a:effectLst/>
-              <a:uLnTx/>
-              <a:uFillTx/>
-              <a:latin typeface="楷体" panose="02010609060101010101" pitchFamily="49" charset="-122"/>
-              <a:ea typeface="楷体" panose="02010609060101010101" pitchFamily="49" charset="-122"/>
-              <a:cs typeface="+mn-cs"/>
-            </a:endParaRPr>
+              <a:t>眼动仪校准流程示意</a:t>
+            </a:r>
           </a:p>
         </p:txBody>
       </p:sp>
@@ -12099,7 +12074,7 @@
         <p:spPr>
           <a:xfrm>
             <a:off x="1500050" y="1645919"/>
-            <a:ext cx="9714412" cy="1630045"/>
+            <a:ext cx="9714412" cy="1525418"/>
           </a:xfrm>
           <a:prstGeom prst="rect">
             <a:avLst/>
@@ -12136,7 +12111,7 @@
                 <a:latin typeface="楷体" panose="02010609060101010101" pitchFamily="49" charset="-122"/>
                 <a:ea typeface="楷体" panose="02010609060101010101" pitchFamily="49" charset="-122"/>
               </a:rPr>
-              <a:t>配合主试，让屏幕上</a:t>
+              <a:t>配合主试，让</a:t>
             </a:r>
             <a:r>
               <a:rPr lang="zh-CN" altLang="en-US" sz="4000" dirty="0">
@@ -12146,7 +12121,7 @@
                 <a:latin typeface="楷体" panose="02010609060101010101" pitchFamily="49" charset="-122"/>
                 <a:ea typeface="楷体" panose="02010609060101010101" pitchFamily="49" charset="-122"/>
               </a:rPr>
-              <a:t>黄色的卡通小脸</a:t>
+              <a:t>黄色卡通小脸</a:t>
             </a:r>
             <a:r>
               <a:rPr lang="zh-CN" altLang="en-US" sz="4000" dirty="0">
@@ -12176,7 +12151,27 @@
                 <a:latin typeface="楷体" panose="02010609060101010101" pitchFamily="49" charset="-122"/>
                 <a:ea typeface="楷体" panose="02010609060101010101" pitchFamily="49" charset="-122"/>
               </a:rPr>
-              <a:t>重合、双眼保持水平</a:t>
+              <a:t>重合、</a:t>
+            </a:r>
+            <a:r>
+              <a:rPr lang="zh-CN" altLang="en-US" sz="4000" b="1" u="sng" dirty="0">
+                <a:solidFill>
+                  <a:prstClr val="black"/>
+                </a:solidFill>
+                <a:latin typeface="楷体" panose="02010609060101010101" pitchFamily="49" charset="-122"/>
+                <a:ea typeface="楷体" panose="02010609060101010101" pitchFamily="49" charset="-122"/>
+              </a:rPr>
+              <a:t>双眼保持水平</a:t>
+            </a:r>
+            <a:r>
+              <a:rPr lang="zh-CN" altLang="en-US" sz="4000" dirty="0">
+                <a:solidFill>
+                  <a:prstClr val="black"/>
+                </a:solidFill>
+                <a:latin typeface="楷体" panose="02010609060101010101" pitchFamily="49" charset="-122"/>
+                <a:ea typeface="楷体" panose="02010609060101010101" pitchFamily="49" charset="-122"/>
+              </a:rPr>
+              <a:t>后，按空格开始校准</a:t>
             </a:r>
             <a:endParaRPr lang="en-US" altLang="zh-CN" sz="4000" dirty="0">
               <a:solidFill>
@@ -12748,7 +12743,7 @@
           <p:nvPr/>
         </p:nvPicPr>
         <p:blipFill>
-          <a:blip r:embed="rId2" cstate="hqprint">
+          <a:blip r:embed="rId4" cstate="hqprint">
             <a:clrChange>
               <a:clrFrom>
                 <a:srgbClr val="7F7F7F"/>
@@ -12820,19 +12815,24 @@
           <p:nvPr/>
         </p:nvPicPr>
         <p:blipFill>
-          <a:blip r:embed="rId1"/>
+          <a:blip r:embed="rId3"/>
           <a:stretch>
             <a:fillRect/>
           </a:stretch>
         </p:blipFill>
         <p:spPr>
           <a:xfrm>
-            <a:off x="1969925" y="2516142"/>
-            <a:ext cx="7590792" cy="4269820"/>
+            <a:off x="2064928" y="3331176"/>
+            <a:ext cx="5855914" cy="3293951"/>
           </a:xfrm>
           <a:prstGeom prst="rect">
             <a:avLst/>
           </a:prstGeom>
+          <a:ln w="28575">
+            <a:solidFill>
+              <a:schemeClr val="tx1"/>
+            </a:solidFill>
+          </a:ln>
         </p:spPr>
       </p:pic>
       <p:sp>
@@ -12888,22 +12888,8 @@
                 <a:ea typeface="楷体" panose="02010609060101010101" pitchFamily="49" charset="-122"/>
                 <a:cs typeface="+mn-cs"/>
               </a:rPr>
-              <a:t>眼动仪校准</a:t>
-            </a:r>
-            <a:endParaRPr kumimoji="0" lang="zh-CN" altLang="en-US" sz="5400" b="0" i="0" u="none" strike="noStrike" kern="1200" cap="none" spc="0" normalizeH="0" baseline="0" noProof="0" dirty="0">
-              <a:ln>
-                <a:noFill/>
-              </a:ln>
-              <a:solidFill>
-                <a:prstClr val="black"/>
-              </a:solidFill>
-              <a:effectLst/>
-              <a:uLnTx/>
-              <a:uFillTx/>
-              <a:latin typeface="楷体" panose="02010609060101010101" pitchFamily="49" charset="-122"/>
-              <a:ea typeface="楷体" panose="02010609060101010101" pitchFamily="49" charset="-122"/>
-              <a:cs typeface="+mn-cs"/>
-            </a:endParaRPr>
+              <a:t>眼动仪校准流程示意</a:t>
+            </a:r>
           </a:p>
         </p:txBody>
       </p:sp>
@@ -12916,7 +12902,7 @@
         <p:spPr>
           <a:xfrm>
             <a:off x="1500050" y="1645919"/>
-            <a:ext cx="9714412" cy="755976"/>
+            <a:ext cx="9714412" cy="1525418"/>
           </a:xfrm>
           <a:prstGeom prst="rect">
             <a:avLst/>
@@ -12946,6 +12932,16 @@
               <a:defRPr/>
             </a:pPr>
             <a:r>
+              <a:rPr lang="zh-CN" altLang="en-US" sz="4000" b="1" u="sng" dirty="0">
+                <a:solidFill>
+                  <a:prstClr val="black"/>
+                </a:solidFill>
+                <a:latin typeface="黑体" panose="02010609060101010101" pitchFamily="49" charset="-122"/>
+                <a:ea typeface="黑体" panose="02010609060101010101" pitchFamily="49" charset="-122"/>
+              </a:rPr>
+              <a:t>睁大眼睛</a:t>
+            </a:r>
+            <a:r>
               <a:rPr lang="zh-CN" altLang="en-US" sz="4000" dirty="0">
                 <a:solidFill>
                   <a:prstClr val="black"/>
@@ -12953,21 +12949,39 @@
                 <a:latin typeface="楷体" panose="02010609060101010101" pitchFamily="49" charset="-122"/>
                 <a:ea typeface="楷体" panose="02010609060101010101" pitchFamily="49" charset="-122"/>
               </a:rPr>
-              <a:t>按空格开始校准，用眼睛追踪光斑</a:t>
-            </a:r>
-            <a:endParaRPr kumimoji="0" lang="en-US" altLang="zh-CN" sz="4000" b="0" i="0" u="none" strike="noStrike" kern="1200" cap="none" spc="0" normalizeH="0" baseline="0" noProof="0" dirty="0">
-              <a:ln>
-                <a:noFill/>
-              </a:ln>
+              <a:t>，用视线追踪光斑移动</a:t>
+            </a:r>
+            <a:endParaRPr lang="en-US" altLang="zh-CN" sz="4000" dirty="0">
               <a:solidFill>
                 <a:prstClr val="black"/>
               </a:solidFill>
-              <a:effectLst/>
-              <a:uLnTx/>
-              <a:uFillTx/>
               <a:latin typeface="楷体" panose="02010609060101010101" pitchFamily="49" charset="-122"/>
               <a:ea typeface="楷体" panose="02010609060101010101" pitchFamily="49" charset="-122"/>
-              <a:cs typeface="+mn-cs"/>
+            </a:endParaRPr>
+          </a:p>
+          <a:p>
+            <a:pPr lvl="1">
+              <a:lnSpc>
+                <a:spcPct val="125000"/>
+              </a:lnSpc>
+              <a:defRPr/>
+            </a:pPr>
+            <a:r>
+              <a:rPr lang="zh-CN" altLang="en-US" sz="4000" dirty="0">
+                <a:solidFill>
+                  <a:prstClr val="black"/>
+                </a:solidFill>
+                <a:latin typeface="楷体" panose="02010609060101010101" pitchFamily="49" charset="-122"/>
+                <a:ea typeface="楷体" panose="02010609060101010101" pitchFamily="49" charset="-122"/>
+              </a:rPr>
+              <a:t>当光斑停在某处时，尽量不要眨眼</a:t>
+            </a:r>
+            <a:endParaRPr lang="en-US" altLang="zh-CN" sz="4000" dirty="0">
+              <a:solidFill>
+                <a:prstClr val="black"/>
+              </a:solidFill>
+              <a:latin typeface="楷体" panose="02010609060101010101" pitchFamily="49" charset="-122"/>
+              <a:ea typeface="楷体" panose="02010609060101010101" pitchFamily="49" charset="-122"/>
             </a:endParaRPr>
           </a:p>
         </p:txBody>
@@ -13185,14 +13199,14 @@
           <p:nvPr/>
         </p:nvPicPr>
         <p:blipFill>
-          <a:blip r:embed="rId2"/>
+          <a:blip r:embed="rId4"/>
           <a:stretch>
             <a:fillRect/>
           </a:stretch>
         </p:blipFill>
         <p:spPr>
           <a:xfrm>
-            <a:off x="10058127" y="1880371"/>
+            <a:off x="9641081" y="1880371"/>
             <a:ext cx="371478" cy="385765"/>
           </a:xfrm>
           <a:prstGeom prst="rect">
@@ -13208,7 +13222,7 @@
         </p:nvSpPr>
         <p:spPr>
           <a:xfrm>
-            <a:off x="4134926" y="4209691"/>
+            <a:off x="3458032" y="4589701"/>
             <a:ext cx="3347052" cy="707886"/>
           </a:xfrm>
           <a:prstGeom prst="rect">
@@ -13258,10 +13272,6 @@
               </a:rPr>
               <a:t>开始实验任务</a:t>
             </a:r>
-            <a:endParaRPr lang="zh-CN" altLang="en-US" sz="2000" i="1" dirty="0">
-              <a:latin typeface="楷体" panose="02010609060101010101" pitchFamily="49" charset="-122"/>
-              <a:ea typeface="楷体" panose="02010609060101010101" pitchFamily="49" charset="-122"/>
-            </a:endParaRPr>
           </a:p>
         </p:txBody>
       </p:sp>
@@ -13345,10 +13355,6 @@
               </a:rPr>
               <a:t>练习阶段</a:t>
             </a:r>
-            <a:endParaRPr lang="zh-CN" altLang="en-US" sz="5400" dirty="0">
-              <a:latin typeface="楷体" panose="02010609060101010101" pitchFamily="49" charset="-122"/>
-              <a:ea typeface="楷体" panose="02010609060101010101" pitchFamily="49" charset="-122"/>
-            </a:endParaRPr>
           </a:p>
         </p:txBody>
       </p:sp>
@@ -13699,20 +13705,6 @@
               </a:rPr>
               <a:t>练习阶段</a:t>
             </a:r>
-            <a:endParaRPr kumimoji="0" lang="zh-CN" altLang="en-US" sz="5400" b="0" i="0" u="none" strike="noStrike" kern="1200" cap="none" spc="0" normalizeH="0" baseline="0" noProof="0" dirty="0">
-              <a:ln>
-                <a:noFill/>
-              </a:ln>
-              <a:solidFill>
-                <a:prstClr val="black"/>
-              </a:solidFill>
-              <a:effectLst/>
-              <a:uLnTx/>
-              <a:uFillTx/>
-              <a:latin typeface="楷体" panose="02010609060101010101" pitchFamily="49" charset="-122"/>
-              <a:ea typeface="楷体" panose="02010609060101010101" pitchFamily="49" charset="-122"/>
-              <a:cs typeface="+mn-cs"/>
-            </a:endParaRPr>
           </a:p>
         </p:txBody>
       </p:sp>
@@ -13819,6 +13811,22 @@
               <a:defRPr/>
             </a:pPr>
             <a:r>
+              <a:rPr kumimoji="0" lang="zh-CN" altLang="en-US" sz="4000" b="1" i="0" u="sng" strike="noStrike" kern="1200" cap="none" spc="0" normalizeH="0" baseline="0" noProof="0" dirty="0">
+                <a:ln>
+                  <a:noFill/>
+                </a:ln>
+                <a:solidFill>
+                  <a:prstClr val="black"/>
+                </a:solidFill>
+                <a:effectLst/>
+                <a:uLnTx/>
+                <a:uFillTx/>
+                <a:latin typeface="黑体" panose="02010609060101010101" pitchFamily="49" charset="-122"/>
+                <a:ea typeface="黑体" panose="02010609060101010101" pitchFamily="49" charset="-122"/>
+              </a:rPr>
+              <a:t>10秒内</a:t>
+            </a:r>
+            <a:r>
               <a:rPr kumimoji="0" lang="zh-CN" altLang="en-US" sz="4000" b="0" i="0" u="none" strike="noStrike" kern="1200" cap="none" spc="0" normalizeH="0" baseline="0" noProof="0" dirty="0">
                 <a:ln>
                   <a:noFill/>
@@ -13833,7 +13841,7 @@
                 <a:ea typeface="楷体" panose="02010609060101010101" pitchFamily="49" charset="-122"/>
                 <a:cs typeface="+mn-cs"/>
               </a:rPr>
-              <a:t>尽快找到藏在黑白花纹中的小光栅</a:t>
+              <a:t>找到藏在黑白花纹中的小光栅</a:t>
             </a:r>
             <a:endParaRPr kumimoji="0" lang="en-US" altLang="zh-CN" sz="4000" b="0" i="0" u="none" strike="noStrike" kern="1200" cap="none" spc="0" normalizeH="0" baseline="0" noProof="0" dirty="0">
               <a:ln>
@@ -13996,7 +14004,7 @@
           <p:nvPr/>
         </p:nvPicPr>
         <p:blipFill>
-          <a:blip r:embed="rId1" cstate="hqprint"/>
+          <a:blip r:embed="rId2" cstate="hqprint"/>
           <a:srcRect/>
           <a:stretch>
             <a:fillRect/>
@@ -14137,20 +14145,6 @@
               </a:rPr>
               <a:t>练习阶段</a:t>
             </a:r>
-            <a:endParaRPr kumimoji="0" lang="zh-CN" altLang="en-US" sz="5400" b="0" i="0" u="none" strike="noStrike" kern="1200" cap="none" spc="0" normalizeH="0" baseline="0" noProof="0" dirty="0">
-              <a:ln>
-                <a:noFill/>
-              </a:ln>
-              <a:solidFill>
-                <a:prstClr val="black"/>
-              </a:solidFill>
-              <a:effectLst/>
-              <a:uLnTx/>
-              <a:uFillTx/>
-              <a:latin typeface="楷体" panose="02010609060101010101" pitchFamily="49" charset="-122"/>
-              <a:ea typeface="楷体" panose="02010609060101010101" pitchFamily="49" charset="-122"/>
-              <a:cs typeface="+mn-cs"/>
-            </a:endParaRPr>
           </a:p>
         </p:txBody>
       </p:sp>
@@ -14257,6 +14251,16 @@
               <a:defRPr/>
             </a:pPr>
             <a:r>
+              <a:rPr lang="zh-CN" altLang="en-US" sz="4000" b="1" u="sng" dirty="0">
+                <a:solidFill>
+                  <a:prstClr val="black"/>
+                </a:solidFill>
+                <a:latin typeface="黑体" panose="02010609060101010101" pitchFamily="49" charset="-122"/>
+                <a:ea typeface="黑体" panose="02010609060101010101" pitchFamily="49" charset="-122"/>
+              </a:rPr>
+              <a:t>10秒内</a:t>
+            </a:r>
+            <a:r>
               <a:rPr kumimoji="0" lang="zh-CN" altLang="en-US" sz="4000" b="0" i="0" u="none" strike="noStrike" kern="1200" cap="none" spc="0" normalizeH="0" baseline="0" noProof="0" dirty="0">
                 <a:ln>
                   <a:noFill/>
@@ -14271,7 +14275,7 @@
                 <a:ea typeface="楷体" panose="02010609060101010101" pitchFamily="49" charset="-122"/>
                 <a:cs typeface="+mn-cs"/>
               </a:rPr>
-              <a:t>尽快找到藏在黑白花纹中的小光栅</a:t>
+              <a:t>找到藏在黑白花纹中的小光栅</a:t>
             </a:r>
             <a:endParaRPr kumimoji="0" lang="en-US" altLang="zh-CN" sz="4000" b="0" i="0" u="none" strike="noStrike" kern="1200" cap="none" spc="0" normalizeH="0" baseline="0" noProof="0" dirty="0">
               <a:ln>
@@ -14573,7 +14577,7 @@
           <p:nvPr/>
         </p:nvPicPr>
         <p:blipFill>
-          <a:blip r:embed="rId1" cstate="hqprint"/>
+          <a:blip r:embed="rId2" cstate="hqprint"/>
           <a:srcRect/>
           <a:stretch>
             <a:fillRect/>
@@ -14714,20 +14718,6 @@
               </a:rPr>
               <a:t>练习阶段</a:t>
             </a:r>
-            <a:endParaRPr kumimoji="0" lang="zh-CN" altLang="en-US" sz="5400" b="0" i="0" u="none" strike="noStrike" kern="1200" cap="none" spc="0" normalizeH="0" baseline="0" noProof="0" dirty="0">
-              <a:ln>
-                <a:noFill/>
-              </a:ln>
-              <a:solidFill>
-                <a:prstClr val="black"/>
-              </a:solidFill>
-              <a:effectLst/>
-              <a:uLnTx/>
-              <a:uFillTx/>
-              <a:latin typeface="楷体" panose="02010609060101010101" pitchFamily="49" charset="-122"/>
-              <a:ea typeface="楷体" panose="02010609060101010101" pitchFamily="49" charset="-122"/>
-              <a:cs typeface="+mn-cs"/>
-            </a:endParaRPr>
           </a:p>
         </p:txBody>
       </p:sp>
@@ -14740,7 +14730,7 @@
         <p:spPr>
           <a:xfrm>
             <a:off x="1500050" y="1645919"/>
-            <a:ext cx="9714412" cy="3064300"/>
+            <a:ext cx="9714412" cy="3169285"/>
           </a:xfrm>
           <a:prstGeom prst="rect">
             <a:avLst/>
@@ -14834,6 +14824,16 @@
               <a:defRPr/>
             </a:pPr>
             <a:r>
+              <a:rPr lang="zh-CN" altLang="en-US" sz="4000" b="1" u="sng" dirty="0">
+                <a:solidFill>
+                  <a:prstClr val="black"/>
+                </a:solidFill>
+                <a:latin typeface="黑体" panose="02010609060101010101" pitchFamily="49" charset="-122"/>
+                <a:ea typeface="黑体" panose="02010609060101010101" pitchFamily="49" charset="-122"/>
+              </a:rPr>
+              <a:t>10秒内</a:t>
+            </a:r>
+            <a:r>
               <a:rPr kumimoji="0" lang="zh-CN" altLang="en-US" sz="4000" b="0" i="0" u="none" strike="noStrike" kern="1200" cap="none" spc="0" normalizeH="0" baseline="0" noProof="0" dirty="0">
                 <a:ln>
                   <a:noFill/>
@@ -14848,7 +14848,7 @@
                 <a:ea typeface="楷体" panose="02010609060101010101" pitchFamily="49" charset="-122"/>
                 <a:cs typeface="+mn-cs"/>
               </a:rPr>
-              <a:t>尽快找到藏在黑白花纹中的小光栅</a:t>
+              <a:t>找到藏在黑白花纹中的小光栅</a:t>
             </a:r>
             <a:endParaRPr kumimoji="0" lang="en-US" altLang="zh-CN" sz="4000" b="0" i="0" u="none" strike="noStrike" kern="1200" cap="none" spc="0" normalizeH="0" baseline="0" noProof="0" dirty="0">
               <a:ln>
@@ -15248,7 +15248,7 @@
           <p:nvPr/>
         </p:nvPicPr>
         <p:blipFill>
-          <a:blip r:embed="rId1" cstate="hqprint"/>
+          <a:blip r:embed="rId2" cstate="hqprint"/>
           <a:srcRect/>
           <a:stretch>
             <a:fillRect/>
@@ -15389,20 +15389,6 @@
               </a:rPr>
               <a:t>练习阶段</a:t>
             </a:r>
-            <a:endParaRPr kumimoji="0" lang="zh-CN" altLang="en-US" sz="5400" b="0" i="0" u="none" strike="noStrike" kern="1200" cap="none" spc="0" normalizeH="0" baseline="0" noProof="0" dirty="0">
-              <a:ln>
-                <a:noFill/>
-              </a:ln>
-              <a:solidFill>
-                <a:prstClr val="black"/>
-              </a:solidFill>
-              <a:effectLst/>
-              <a:uLnTx/>
-              <a:uFillTx/>
-              <a:latin typeface="楷体" panose="02010609060101010101" pitchFamily="49" charset="-122"/>
-              <a:ea typeface="楷体" panose="02010609060101010101" pitchFamily="49" charset="-122"/>
-              <a:cs typeface="+mn-cs"/>
-            </a:endParaRPr>
           </a:p>
         </p:txBody>
       </p:sp>
@@ -15415,7 +15401,7 @@
         <p:spPr>
           <a:xfrm>
             <a:off x="1500050" y="1645919"/>
-            <a:ext cx="9714412" cy="3833742"/>
+            <a:ext cx="9714412" cy="3938270"/>
           </a:xfrm>
           <a:prstGeom prst="rect">
             <a:avLst/>
@@ -15509,6 +15495,16 @@
               <a:defRPr/>
             </a:pPr>
             <a:r>
+              <a:rPr lang="zh-CN" altLang="en-US" sz="4000" b="1" u="sng" dirty="0">
+                <a:solidFill>
+                  <a:prstClr val="black"/>
+                </a:solidFill>
+                <a:latin typeface="黑体" panose="02010609060101010101" pitchFamily="49" charset="-122"/>
+                <a:ea typeface="黑体" panose="02010609060101010101" pitchFamily="49" charset="-122"/>
+              </a:rPr>
+              <a:t>10秒内</a:t>
+            </a:r>
+            <a:r>
               <a:rPr kumimoji="0" lang="zh-CN" altLang="en-US" sz="4000" b="0" i="0" u="none" strike="noStrike" kern="1200" cap="none" spc="0" normalizeH="0" baseline="0" noProof="0" dirty="0">
                 <a:ln>
                   <a:noFill/>
@@ -15523,7 +15519,7 @@
                 <a:ea typeface="楷体" panose="02010609060101010101" pitchFamily="49" charset="-122"/>
                 <a:cs typeface="+mn-cs"/>
               </a:rPr>
-              <a:t>尽快找到藏在黑白花纹中的小光栅</a:t>
+              <a:t>找到藏在黑白花纹中的小光栅</a:t>
             </a:r>
             <a:endParaRPr kumimoji="0" lang="en-US" altLang="zh-CN" sz="4000" b="0" i="0" u="none" strike="noStrike" kern="1200" cap="none" spc="0" normalizeH="0" baseline="0" noProof="0" dirty="0">
               <a:ln>
@@ -16022,7 +16018,7 @@
           <p:nvPr/>
         </p:nvPicPr>
         <p:blipFill>
-          <a:blip r:embed="rId1" cstate="hqprint"/>
+          <a:blip r:embed="rId2" cstate="hqprint"/>
           <a:srcRect/>
           <a:stretch>
             <a:fillRect/>
@@ -16318,6 +16314,7 @@
       </a:style>
     </a:lnDef>
   </a:objectDefaults>
+  <a:extraClrSchemeLst/>
   <a:extLst>
     <a:ext uri="{05A4C25C-085E-4340-85A3-A5531E510DB2}">
       <thm15:themeFamily xmlns:thm15="http://schemas.microsoft.com/office/thememl/2012/main" name="Office Theme" id="{62F939B6-93AF-4DB8-9C6B-D6C7DFDC589F}" vid="{4A3C46E8-61CC-4603-A589-7422A47A8E4A}"/>
@@ -16598,6 +16595,7 @@
       </a:style>
     </a:lnDef>
   </a:objectDefaults>
+  <a:extraClrSchemeLst/>
   <a:extLst>
     <a:ext uri="{05A4C25C-085E-4340-85A3-A5531E510DB2}">
       <thm15:themeFamily xmlns:thm15="http://schemas.microsoft.com/office/thememl/2012/main" name="Office Theme" id="{62F939B6-93AF-4DB8-9C6B-D6C7DFDC589F}" vid="{4A3C46E8-61CC-4603-A589-7422A47A8E4A}"/>
@@ -16878,6 +16876,268 @@
       </a:style>
     </a:lnDef>
   </a:objectDefaults>
+  <a:extraClrSchemeLst/>
+  <a:extLst>
+    <a:ext uri="{05A4C25C-085E-4340-85A3-A5531E510DB2}">
+      <thm15:themeFamily xmlns:thm15="http://schemas.microsoft.com/office/thememl/2012/main" name="Office Theme" id="{62F939B6-93AF-4DB8-9C6B-D6C7DFDC589F}" vid="{4A3C46E8-61CC-4603-A589-7422A47A8E4A}"/>
+    </a:ext>
+  </a:extLst>
+</a:theme>
+</file>
+
+<file path=ppt/theme/theme4.xml><?xml version="1.0" encoding="utf-8"?>
+<a:theme xmlns:a="http://schemas.openxmlformats.org/drawingml/2006/main" name="Office 主题">
+  <a:themeElements>
+    <a:clrScheme name="Office">
+      <a:dk1>
+        <a:sysClr val="windowText" lastClr="000000"/>
+      </a:dk1>
+      <a:lt1>
+        <a:sysClr val="window" lastClr="FFFFFF"/>
+      </a:lt1>
+      <a:dk2>
+        <a:srgbClr val="44546A"/>
+      </a:dk2>
+      <a:lt2>
+        <a:srgbClr val="E7E6E6"/>
+      </a:lt2>
+      <a:accent1>
+        <a:srgbClr val="5B9BD5"/>
+      </a:accent1>
+      <a:accent2>
+        <a:srgbClr val="ED7D31"/>
+      </a:accent2>
+      <a:accent3>
+        <a:srgbClr val="A5A5A5"/>
+      </a:accent3>
+      <a:accent4>
+        <a:srgbClr val="FFC000"/>
+      </a:accent4>
+      <a:accent5>
+        <a:srgbClr val="4472C4"/>
+      </a:accent5>
+      <a:accent6>
+        <a:srgbClr val="70AD47"/>
+      </a:accent6>
+      <a:hlink>
+        <a:srgbClr val="0563C1"/>
+      </a:hlink>
+      <a:folHlink>
+        <a:srgbClr val="954F72"/>
+      </a:folHlink>
+    </a:clrScheme>
+    <a:fontScheme name="Office">
+      <a:majorFont>
+        <a:latin typeface="Calibri Light"/>
+        <a:ea typeface=""/>
+        <a:cs typeface=""/>
+        <a:font script="Jpan" typeface="ＭＳ Ｐゴシック"/>
+        <a:font script="Hang" typeface="맑은 고딕"/>
+        <a:font script="Hans" typeface="宋体"/>
+        <a:font script="Hant" typeface="新細明體"/>
+        <a:font script="Arab" typeface="Times New Roman"/>
+        <a:font script="Hebr" typeface="Times New Roman"/>
+        <a:font script="Thai" typeface="Angsana New"/>
+        <a:font script="Ethi" typeface="Nyala"/>
+        <a:font script="Beng" typeface="Vrinda"/>
+        <a:font script="Gujr" typeface="Shruti"/>
+        <a:font script="Khmr" typeface="MoolBoran"/>
+        <a:font script="Knda" typeface="Tunga"/>
+        <a:font script="Guru" typeface="Raavi"/>
+        <a:font script="Cans" typeface="Euphemia"/>
+        <a:font script="Cher" typeface="Plantagenet Cherokee"/>
+        <a:font script="Yiii" typeface="Microsoft Yi Baiti"/>
+        <a:font script="Tibt" typeface="Microsoft Himalaya"/>
+        <a:font script="Thaa" typeface="MV Boli"/>
+        <a:font script="Deva" typeface="Mangal"/>
+        <a:font script="Telu" typeface="Gautami"/>
+        <a:font script="Taml" typeface="Latha"/>
+        <a:font script="Syrc" typeface="Estrangelo Edessa"/>
+        <a:font script="Orya" typeface="Kalinga"/>
+        <a:font script="Mlym" typeface="Kartika"/>
+        <a:font script="Laoo" typeface="DokChampa"/>
+        <a:font script="Sinh" typeface="Iskoola Pota"/>
+        <a:font script="Mong" typeface="Mongolian Baiti"/>
+        <a:font script="Viet" typeface="Times New Roman"/>
+        <a:font script="Uigh" typeface="Microsoft Uighur"/>
+        <a:font script="Geor" typeface="Sylfaen"/>
+      </a:majorFont>
+      <a:minorFont>
+        <a:latin typeface="Calibri"/>
+        <a:ea typeface=""/>
+        <a:cs typeface=""/>
+        <a:font script="Jpan" typeface="ＭＳ Ｐゴシック"/>
+        <a:font script="Hang" typeface="맑은 고딕"/>
+        <a:font script="Hans" typeface="宋体"/>
+        <a:font script="Hant" typeface="新細明體"/>
+        <a:font script="Arab" typeface="Arial"/>
+        <a:font script="Hebr" typeface="Arial"/>
+        <a:font script="Thai" typeface="Cordia New"/>
+        <a:font script="Ethi" typeface="Nyala"/>
+        <a:font script="Beng" typeface="Vrinda"/>
+        <a:font script="Gujr" typeface="Shruti"/>
+        <a:font script="Khmr" typeface="DaunPenh"/>
+        <a:font script="Knda" typeface="Tunga"/>
+        <a:font script="Guru" typeface="Raavi"/>
+        <a:font script="Cans" typeface="Euphemia"/>
+        <a:font script="Cher" typeface="Plantagenet Cherokee"/>
+        <a:font script="Yiii" typeface="Microsoft Yi Baiti"/>
+        <a:font script="Tibt" typeface="Microsoft Himalaya"/>
+        <a:font script="Thaa" typeface="MV Boli"/>
+        <a:font script="Deva" typeface="Mangal"/>
+        <a:font script="Telu" typeface="Gautami"/>
+        <a:font script="Taml" typeface="Latha"/>
+        <a:font script="Syrc" typeface="Estrangelo Edessa"/>
+        <a:font script="Orya" typeface="Kalinga"/>
+        <a:font script="Mlym" typeface="Kartika"/>
+        <a:font script="Laoo" typeface="DokChampa"/>
+        <a:font script="Sinh" typeface="Iskoola Pota"/>
+        <a:font script="Mong" typeface="Mongolian Baiti"/>
+        <a:font script="Viet" typeface="Arial"/>
+        <a:font script="Uigh" typeface="Microsoft Uighur"/>
+        <a:font script="Geor" typeface="Sylfaen"/>
+      </a:minorFont>
+    </a:fontScheme>
+    <a:fmtScheme name="Office">
+      <a:fillStyleLst>
+        <a:solidFill>
+          <a:schemeClr val="phClr"/>
+        </a:solidFill>
+        <a:gradFill rotWithShape="1">
+          <a:gsLst>
+            <a:gs pos="0">
+              <a:schemeClr val="phClr">
+                <a:lumMod val="110000"/>
+                <a:satMod val="105000"/>
+                <a:tint val="67000"/>
+              </a:schemeClr>
+            </a:gs>
+            <a:gs pos="50000">
+              <a:schemeClr val="phClr">
+                <a:lumMod val="105000"/>
+                <a:satMod val="103000"/>
+                <a:tint val="73000"/>
+              </a:schemeClr>
+            </a:gs>
+            <a:gs pos="100000">
+              <a:schemeClr val="phClr">
+                <a:lumMod val="105000"/>
+                <a:satMod val="109000"/>
+                <a:tint val="81000"/>
+              </a:schemeClr>
+            </a:gs>
+          </a:gsLst>
+          <a:lin ang="5400000" scaled="0"/>
+        </a:gradFill>
+        <a:gradFill rotWithShape="1">
+          <a:gsLst>
+            <a:gs pos="0">
+              <a:schemeClr val="phClr">
+                <a:satMod val="103000"/>
+                <a:lumMod val="102000"/>
+                <a:tint val="94000"/>
+              </a:schemeClr>
+            </a:gs>
+            <a:gs pos="50000">
+              <a:schemeClr val="phClr">
+                <a:satMod val="110000"/>
+                <a:lumMod val="100000"/>
+                <a:shade val="100000"/>
+              </a:schemeClr>
+            </a:gs>
+            <a:gs pos="100000">
+              <a:schemeClr val="phClr">
+                <a:lumMod val="99000"/>
+                <a:satMod val="120000"/>
+                <a:shade val="78000"/>
+              </a:schemeClr>
+            </a:gs>
+          </a:gsLst>
+          <a:lin ang="5400000" scaled="0"/>
+        </a:gradFill>
+      </a:fillStyleLst>
+      <a:lnStyleLst>
+        <a:ln w="6350" cap="flat" cmpd="sng" algn="ctr">
+          <a:solidFill>
+            <a:schemeClr val="phClr"/>
+          </a:solidFill>
+          <a:prstDash val="solid"/>
+          <a:miter lim="800000"/>
+        </a:ln>
+        <a:ln w="12700" cap="flat" cmpd="sng" algn="ctr">
+          <a:solidFill>
+            <a:schemeClr val="phClr"/>
+          </a:solidFill>
+          <a:prstDash val="solid"/>
+          <a:miter lim="800000"/>
+        </a:ln>
+        <a:ln w="19050" cap="flat" cmpd="sng" algn="ctr">
+          <a:solidFill>
+            <a:schemeClr val="phClr"/>
+          </a:solidFill>
+          <a:prstDash val="solid"/>
+          <a:miter lim="800000"/>
+        </a:ln>
+      </a:lnStyleLst>
+      <a:effectStyleLst>
+        <a:effectStyle>
+          <a:effectLst/>
+        </a:effectStyle>
+        <a:effectStyle>
+          <a:effectLst/>
+        </a:effectStyle>
+        <a:effectStyle>
+          <a:effectLst>
+            <a:outerShdw blurRad="57150" dist="19050" dir="5400000" algn="ctr" rotWithShape="0">
+              <a:srgbClr val="000000">
+                <a:alpha val="63000"/>
+              </a:srgbClr>
+            </a:outerShdw>
+          </a:effectLst>
+        </a:effectStyle>
+      </a:effectStyleLst>
+      <a:bgFillStyleLst>
+        <a:solidFill>
+          <a:schemeClr val="phClr"/>
+        </a:solidFill>
+        <a:solidFill>
+          <a:schemeClr val="phClr">
+            <a:tint val="95000"/>
+            <a:satMod val="170000"/>
+          </a:schemeClr>
+        </a:solidFill>
+        <a:gradFill rotWithShape="1">
+          <a:gsLst>
+            <a:gs pos="0">
+              <a:schemeClr val="phClr">
+                <a:tint val="93000"/>
+                <a:satMod val="150000"/>
+                <a:shade val="98000"/>
+                <a:lumMod val="102000"/>
+              </a:schemeClr>
+            </a:gs>
+            <a:gs pos="50000">
+              <a:schemeClr val="phClr">
+                <a:tint val="98000"/>
+                <a:satMod val="130000"/>
+                <a:shade val="90000"/>
+                <a:lumMod val="103000"/>
+              </a:schemeClr>
+            </a:gs>
+            <a:gs pos="100000">
+              <a:schemeClr val="phClr">
+                <a:shade val="63000"/>
+                <a:satMod val="120000"/>
+              </a:schemeClr>
+            </a:gs>
+          </a:gsLst>
+          <a:lin ang="5400000" scaled="0"/>
+        </a:gradFill>
+      </a:bgFillStyleLst>
+    </a:fmtScheme>
+  </a:themeElements>
+  <a:objectDefaults/>
+  <a:extraClrSchemeLst/>
   <a:extLst>
     <a:ext uri="{05A4C25C-085E-4340-85A3-A5531E510DB2}">
       <thm15:themeFamily xmlns:thm15="http://schemas.microsoft.com/office/thememl/2012/main" name="Office Theme" id="{62F939B6-93AF-4DB8-9C6B-D6C7DFDC589F}" vid="{4A3C46E8-61CC-4603-A589-7422A47A8E4A}"/>

</xml_diff>